<commit_message>
consistent use of 'deviceID'
</commit_message>
<xml_diff>
--- a/content/designs/telemetry_archiving/atlas-archiving.pptx
+++ b/content/designs/telemetry_archiving/atlas-archiving.pptx
@@ -8,7 +8,7 @@
     <p:notesMasterId r:id="rId3"/>
   </p:notesMasterIdLst>
   <p:sldIdLst>
-    <p:sldId id="256" r:id="rId2"/>
+    <p:sldId id="263" r:id="rId2"/>
   </p:sldIdLst>
   <p:sldSz cx="13004800" cy="9753600"/>
   <p:notesSz cx="6858000" cy="9144000"/>
@@ -2128,7 +2128,7 @@
           </a:ln>
           <a:extLst>
             <a:ext uri="{C572A759-6A51-4108-AA02-DFA0A04FC94B}">
-              <ma14:wrappingTextBoxFlag xmlns:ma14="http://schemas.microsoft.com/office/mac/drawingml/2011/main" val="1"/>
+              <ma14:wrappingTextBoxFlag xmlns:ma14="http://schemas.microsoft.com/office/mac/drawingml/2011/main" xmlns="" val="1"/>
             </a:ext>
           </a:extLst>
         </p:spPr>
@@ -2167,7 +2167,7 @@
           </a:ln>
           <a:extLst>
             <a:ext uri="{C572A759-6A51-4108-AA02-DFA0A04FC94B}">
-              <ma14:wrappingTextBoxFlag xmlns:ma14="http://schemas.microsoft.com/office/mac/drawingml/2011/main" val="1"/>
+              <ma14:wrappingTextBoxFlag xmlns:ma14="http://schemas.microsoft.com/office/mac/drawingml/2011/main" xmlns="" val="1"/>
             </a:ext>
           </a:extLst>
         </p:spPr>
@@ -3075,36 +3075,6 @@
           <a:chExt cx="0" cy="0"/>
         </a:xfrm>
       </p:grpSpPr>
-      <p:pic>
-        <p:nvPicPr>
-          <p:cNvPr id="5" name="Picture 4"/>
-          <p:cNvPicPr>
-            <a:picLocks noChangeAspect="1"/>
-          </p:cNvPicPr>
-          <p:nvPr/>
-        </p:nvPicPr>
-        <p:blipFill>
-          <a:blip r:embed="rId2">
-            <a:extLst>
-              <a:ext uri="{28A0092B-C50C-407E-A947-70E740481C1C}">
-                <a14:useLocalDpi xmlns:a14="http://schemas.microsoft.com/office/drawing/2010/main" val="0"/>
-              </a:ext>
-            </a:extLst>
-          </a:blip>
-          <a:stretch>
-            <a:fillRect/>
-          </a:stretch>
-        </p:blipFill>
-        <p:spPr>
-          <a:xfrm rot="5400000">
-            <a:off x="3750043" y="813348"/>
-            <a:ext cx="1270000" cy="1270000"/>
-          </a:xfrm>
-          <a:prstGeom prst="rect">
-            <a:avLst/>
-          </a:prstGeom>
-        </p:spPr>
-      </p:pic>
       <p:sp>
         <p:nvSpPr>
           <p:cNvPr id="35" name="Shape 119"/>
@@ -3113,7 +3083,7 @@
         </p:nvSpPr>
         <p:spPr>
           <a:xfrm>
-            <a:off x="3461605" y="407269"/>
+            <a:off x="4535497" y="322205"/>
             <a:ext cx="2572586" cy="2662394"/>
           </a:xfrm>
           <a:prstGeom prst="roundRect">
@@ -3146,485 +3116,13 @@
       </p:sp>
       <p:sp>
         <p:nvSpPr>
-          <p:cNvPr id="120" name="Shape 120"/>
-          <p:cNvSpPr/>
-          <p:nvPr/>
-        </p:nvSpPr>
-        <p:spPr>
-          <a:xfrm flipH="1" flipV="1">
-            <a:off x="1717800" y="1416314"/>
-            <a:ext cx="1465175" cy="11824"/>
-          </a:xfrm>
-          <a:prstGeom prst="line">
-            <a:avLst/>
-          </a:prstGeom>
-          <a:ln w="38100">
-            <a:solidFill>
-              <a:srgbClr val="000000"/>
-            </a:solidFill>
-            <a:miter lim="400000"/>
-            <a:headEnd type="stealth" w="lg" len="lg"/>
-            <a:tailEnd w="lg" len="lg"/>
-          </a:ln>
-        </p:spPr>
-        <p:txBody>
-          <a:bodyPr lIns="50800" tIns="50800" rIns="50800" bIns="50800" anchor="ctr"/>
-          <a:lstStyle/>
-          <a:p>
-            <a:pPr>
-              <a:defRPr sz="2400"/>
-            </a:pPr>
-            <a:endParaRPr/>
-          </a:p>
-        </p:txBody>
-      </p:sp>
-      <p:pic>
-        <p:nvPicPr>
-          <p:cNvPr id="121" name="Internet-Of-Things_AWSIoT_thinggeneric.pdf"/>
-          <p:cNvPicPr>
-            <a:picLocks noChangeAspect="1"/>
-          </p:cNvPicPr>
-          <p:nvPr/>
-        </p:nvPicPr>
-        <p:blipFill>
-          <a:blip r:embed="rId3">
-            <a:extLst/>
-          </a:blip>
-          <a:stretch>
-            <a:fillRect/>
-          </a:stretch>
-        </p:blipFill>
-        <p:spPr>
-          <a:xfrm>
-            <a:off x="330574" y="644117"/>
-            <a:ext cx="1544396" cy="1544396"/>
-          </a:xfrm>
-          <a:prstGeom prst="rect">
-            <a:avLst/>
-          </a:prstGeom>
-          <a:ln w="12700">
-            <a:miter lim="400000"/>
-          </a:ln>
-        </p:spPr>
-      </p:pic>
-      <p:pic>
-        <p:nvPicPr>
-          <p:cNvPr id="122" name="Internet-Of-Things_AWSIoT_sensor.pdf"/>
-          <p:cNvPicPr>
-            <a:picLocks noChangeAspect="1"/>
-          </p:cNvPicPr>
-          <p:nvPr/>
-        </p:nvPicPr>
-        <p:blipFill>
-          <a:blip r:embed="rId4">
-            <a:extLst/>
-          </a:blip>
-          <a:srcRect t="54371"/>
-          <a:stretch>
-            <a:fillRect/>
-          </a:stretch>
-        </p:blipFill>
-        <p:spPr>
-          <a:xfrm>
-            <a:off x="346017" y="2332937"/>
-            <a:ext cx="1544397" cy="704692"/>
-          </a:xfrm>
-          <a:prstGeom prst="rect">
-            <a:avLst/>
-          </a:prstGeom>
-          <a:ln w="12700">
-            <a:miter lim="400000"/>
-          </a:ln>
-        </p:spPr>
-      </p:pic>
-      <p:sp>
-        <p:nvSpPr>
-          <p:cNvPr id="123" name="Shape 123"/>
-          <p:cNvSpPr/>
-          <p:nvPr/>
-        </p:nvSpPr>
-        <p:spPr>
-          <a:xfrm flipV="1">
-            <a:off x="1114865" y="1851279"/>
-            <a:ext cx="1" cy="772198"/>
-          </a:xfrm>
-          <a:prstGeom prst="line">
-            <a:avLst/>
-          </a:prstGeom>
-          <a:ln w="50800">
-            <a:solidFill>
-              <a:srgbClr val="3569A3"/>
-            </a:solidFill>
-            <a:miter lim="400000"/>
-          </a:ln>
-        </p:spPr>
-        <p:txBody>
-          <a:bodyPr lIns="50800" tIns="50800" rIns="50800" bIns="50800" anchor="ctr"/>
-          <a:lstStyle/>
-          <a:p>
-            <a:pPr>
-              <a:defRPr sz="2400"/>
-            </a:pPr>
-            <a:endParaRPr/>
-          </a:p>
-        </p:txBody>
-      </p:sp>
-      <p:sp>
-        <p:nvSpPr>
-          <p:cNvPr id="124" name="Shape 124"/>
-          <p:cNvSpPr/>
-          <p:nvPr/>
-        </p:nvSpPr>
-        <p:spPr>
-          <a:xfrm>
-            <a:off x="641805" y="2874766"/>
-            <a:ext cx="921933" cy="416988"/>
-          </a:xfrm>
-          <a:prstGeom prst="rect">
-            <a:avLst/>
-          </a:prstGeom>
-          <a:ln w="12700">
-            <a:miter lim="400000"/>
-          </a:ln>
-          <a:extLst>
-            <a:ext uri="{C572A759-6A51-4108-AA02-DFA0A04FC94B}">
-              <ma14:wrappingTextBoxFlag xmlns:ma14="http://schemas.microsoft.com/office/mac/drawingml/2011/main" val="1"/>
-            </a:ext>
-          </a:extLst>
-        </p:spPr>
-        <p:txBody>
-          <a:bodyPr lIns="50800" tIns="50800" rIns="50800" bIns="50800" anchor="ctr"/>
-          <a:lstStyle>
-            <a:lvl1pPr>
-              <a:spcBef>
-                <a:spcPts val="4200"/>
-              </a:spcBef>
-              <a:defRPr sz="1800">
-                <a:latin typeface="Helvetica"/>
-                <a:ea typeface="Helvetica"/>
-                <a:cs typeface="Helvetica"/>
-                <a:sym typeface="Helvetica"/>
-              </a:defRPr>
-            </a:lvl1pPr>
-          </a:lstStyle>
-          <a:p>
-            <a:r>
-              <a:t>Sensor</a:t>
-            </a:r>
-          </a:p>
-        </p:txBody>
-      </p:sp>
-      <p:sp>
-        <p:nvSpPr>
-          <p:cNvPr id="125" name="Shape 125"/>
-          <p:cNvSpPr/>
-          <p:nvPr/>
-        </p:nvSpPr>
-        <p:spPr>
-          <a:xfrm>
-            <a:off x="671064" y="407269"/>
-            <a:ext cx="894303" cy="416988"/>
-          </a:xfrm>
-          <a:prstGeom prst="rect">
-            <a:avLst/>
-          </a:prstGeom>
-          <a:ln w="12700">
-            <a:miter lim="400000"/>
-          </a:ln>
-          <a:extLst>
-            <a:ext uri="{C572A759-6A51-4108-AA02-DFA0A04FC94B}">
-              <ma14:wrappingTextBoxFlag xmlns:ma14="http://schemas.microsoft.com/office/mac/drawingml/2011/main" val="1"/>
-            </a:ext>
-          </a:extLst>
-        </p:spPr>
-        <p:txBody>
-          <a:bodyPr lIns="50800" tIns="50800" rIns="50800" bIns="50800" anchor="ctr"/>
-          <a:lstStyle>
-            <a:lvl1pPr>
-              <a:spcBef>
-                <a:spcPts val="4200"/>
-              </a:spcBef>
-              <a:defRPr sz="1800">
-                <a:latin typeface="Helvetica"/>
-                <a:ea typeface="Helvetica"/>
-                <a:cs typeface="Helvetica"/>
-                <a:sym typeface="Helvetica"/>
-              </a:defRPr>
-            </a:lvl1pPr>
-          </a:lstStyle>
-          <a:p>
-            <a:r>
-              <a:t>Device</a:t>
-            </a:r>
-          </a:p>
-        </p:txBody>
-      </p:sp>
-      <p:sp>
-        <p:nvSpPr>
-          <p:cNvPr id="129" name="Shape 129"/>
-          <p:cNvSpPr/>
-          <p:nvPr/>
-        </p:nvSpPr>
-        <p:spPr>
-          <a:xfrm>
-            <a:off x="3256793" y="1252886"/>
-            <a:ext cx="390926" cy="390926"/>
-          </a:xfrm>
-          <a:prstGeom prst="ellipse">
-            <a:avLst/>
-          </a:prstGeom>
-          <a:solidFill>
-            <a:srgbClr val="3569A3"/>
-          </a:solidFill>
-          <a:ln w="12700">
-            <a:miter lim="400000"/>
-          </a:ln>
-        </p:spPr>
-        <p:txBody>
-          <a:bodyPr lIns="50800" tIns="50800" rIns="50800" bIns="50800" anchor="ctr"/>
-          <a:lstStyle/>
-          <a:p>
-            <a:pPr>
-              <a:defRPr sz="2400">
-                <a:solidFill>
-                  <a:srgbClr val="FFFFFF"/>
-                </a:solidFill>
-              </a:defRPr>
-            </a:pPr>
-            <a:endParaRPr/>
-          </a:p>
-        </p:txBody>
-      </p:sp>
-      <p:grpSp>
-        <p:nvGrpSpPr>
-          <p:cNvPr id="135" name="Group 135"/>
-          <p:cNvGrpSpPr/>
-          <p:nvPr/>
-        </p:nvGrpSpPr>
-        <p:grpSpPr>
-          <a:xfrm>
-            <a:off x="1987600" y="1088370"/>
-            <a:ext cx="382033" cy="253092"/>
-            <a:chOff x="0" y="0"/>
-            <a:chExt cx="382032" cy="253090"/>
-          </a:xfrm>
-        </p:grpSpPr>
-        <p:sp>
-          <p:nvSpPr>
-            <p:cNvPr id="132" name="Shape 132"/>
-            <p:cNvSpPr/>
-            <p:nvPr/>
-          </p:nvSpPr>
-          <p:spPr>
-            <a:xfrm>
-              <a:off x="1816" y="0"/>
-              <a:ext cx="379416" cy="253091"/>
-            </a:xfrm>
-            <a:prstGeom prst="rect">
-              <a:avLst/>
-            </a:prstGeom>
-            <a:solidFill>
-              <a:srgbClr val="3569A3"/>
-            </a:solidFill>
-            <a:ln w="12700" cap="flat">
-              <a:noFill/>
-              <a:miter lim="400000"/>
-            </a:ln>
-            <a:effectLst/>
-          </p:spPr>
-          <p:txBody>
-            <a:bodyPr wrap="square" lIns="50800" tIns="50800" rIns="50800" bIns="50800" numCol="1" anchor="ctr">
-              <a:noAutofit/>
-            </a:bodyPr>
-            <a:lstStyle/>
-            <a:p>
-              <a:pPr>
-                <a:defRPr sz="2400">
-                  <a:solidFill>
-                    <a:srgbClr val="FFFFFF"/>
-                  </a:solidFill>
-                </a:defRPr>
-              </a:pPr>
-              <a:endParaRPr/>
-            </a:p>
-          </p:txBody>
-        </p:sp>
-        <p:sp>
-          <p:nvSpPr>
-            <p:cNvPr id="133" name="Shape 133"/>
-            <p:cNvSpPr/>
-            <p:nvPr/>
-          </p:nvSpPr>
-          <p:spPr>
-            <a:xfrm flipV="1">
-              <a:off x="198113" y="4121"/>
-              <a:ext cx="183920" cy="117762"/>
-            </a:xfrm>
-            <a:prstGeom prst="line">
-              <a:avLst/>
-            </a:prstGeom>
-            <a:noFill/>
-            <a:ln w="12700" cap="flat">
-              <a:solidFill>
-                <a:srgbClr val="FFFFFF"/>
-              </a:solidFill>
-              <a:prstDash val="solid"/>
-              <a:miter lim="400000"/>
-            </a:ln>
-            <a:effectLst/>
-          </p:spPr>
-          <p:txBody>
-            <a:bodyPr wrap="square" lIns="50800" tIns="50800" rIns="50800" bIns="50800" numCol="1" anchor="ctr">
-              <a:noAutofit/>
-            </a:bodyPr>
-            <a:lstStyle/>
-            <a:p>
-              <a:pPr>
-                <a:defRPr sz="2400"/>
-              </a:pPr>
-              <a:endParaRPr/>
-            </a:p>
-          </p:txBody>
-        </p:sp>
-        <p:sp>
-          <p:nvSpPr>
-            <p:cNvPr id="134" name="Shape 134"/>
-            <p:cNvSpPr/>
-            <p:nvPr/>
-          </p:nvSpPr>
-          <p:spPr>
-            <a:xfrm flipH="1" flipV="1">
-              <a:off x="0" y="4012"/>
-              <a:ext cx="200712" cy="117871"/>
-            </a:xfrm>
-            <a:prstGeom prst="line">
-              <a:avLst/>
-            </a:prstGeom>
-            <a:noFill/>
-            <a:ln w="12700" cap="flat">
-              <a:solidFill>
-                <a:srgbClr val="FFFFFF"/>
-              </a:solidFill>
-              <a:prstDash val="solid"/>
-              <a:miter lim="400000"/>
-            </a:ln>
-            <a:effectLst/>
-          </p:spPr>
-          <p:txBody>
-            <a:bodyPr wrap="square" lIns="50800" tIns="50800" rIns="50800" bIns="50800" numCol="1" anchor="ctr">
-              <a:noAutofit/>
-            </a:bodyPr>
-            <a:lstStyle/>
-            <a:p>
-              <a:pPr>
-                <a:defRPr sz="2400"/>
-              </a:pPr>
-              <a:endParaRPr/>
-            </a:p>
-          </p:txBody>
-        </p:sp>
-      </p:grpSp>
-      <p:sp>
-        <p:nvSpPr>
-          <p:cNvPr id="136" name="Shape 136"/>
-          <p:cNvSpPr/>
-          <p:nvPr/>
-        </p:nvSpPr>
-        <p:spPr>
-          <a:xfrm>
-            <a:off x="3721185" y="1737856"/>
-            <a:ext cx="890985" cy="339768"/>
-          </a:xfrm>
-          <a:prstGeom prst="rect">
-            <a:avLst/>
-          </a:prstGeom>
-          <a:ln w="12700">
-            <a:miter lim="400000"/>
-          </a:ln>
-          <a:extLst>
-            <a:ext uri="{C572A759-6A51-4108-AA02-DFA0A04FC94B}">
-              <ma14:wrappingTextBoxFlag xmlns:ma14="http://schemas.microsoft.com/office/mac/drawingml/2011/main" val="1"/>
-            </a:ext>
-          </a:extLst>
-        </p:spPr>
-        <p:txBody>
-          <a:bodyPr lIns="50800" tIns="50800" rIns="50800" bIns="50800" anchor="ctr"/>
-          <a:lstStyle>
-            <a:lvl1pPr>
-              <a:spcBef>
-                <a:spcPts val="4200"/>
-              </a:spcBef>
-              <a:defRPr sz="1400">
-                <a:latin typeface="Helvetica"/>
-                <a:ea typeface="Helvetica"/>
-                <a:cs typeface="Helvetica"/>
-                <a:sym typeface="Helvetica"/>
-              </a:defRPr>
-            </a:lvl1pPr>
-          </a:lstStyle>
-          <a:p>
-            <a:r>
-              <a:rPr lang="en-US" dirty="0" smtClean="0"/>
-              <a:t>Rules</a:t>
-            </a:r>
-            <a:endParaRPr dirty="0"/>
-          </a:p>
-        </p:txBody>
-      </p:sp>
-      <p:sp>
-        <p:nvSpPr>
-          <p:cNvPr id="36" name="Shape 136"/>
-          <p:cNvSpPr/>
-          <p:nvPr/>
-        </p:nvSpPr>
-        <p:spPr>
-          <a:xfrm>
-            <a:off x="1733124" y="751938"/>
-            <a:ext cx="890985" cy="339768"/>
-          </a:xfrm>
-          <a:prstGeom prst="rect">
-            <a:avLst/>
-          </a:prstGeom>
-          <a:ln w="12700">
-            <a:miter lim="400000"/>
-          </a:ln>
-          <a:extLst>
-            <a:ext uri="{C572A759-6A51-4108-AA02-DFA0A04FC94B}">
-              <ma14:wrappingTextBoxFlag xmlns:ma14="http://schemas.microsoft.com/office/mac/drawingml/2011/main" val="1"/>
-            </a:ext>
-          </a:extLst>
-        </p:spPr>
-        <p:txBody>
-          <a:bodyPr lIns="50800" tIns="50800" rIns="50800" bIns="50800" anchor="ctr"/>
-          <a:lstStyle>
-            <a:lvl1pPr>
-              <a:spcBef>
-                <a:spcPts val="4200"/>
-              </a:spcBef>
-              <a:defRPr sz="1400">
-                <a:latin typeface="Helvetica"/>
-                <a:ea typeface="Helvetica"/>
-                <a:cs typeface="Helvetica"/>
-                <a:sym typeface="Helvetica"/>
-              </a:defRPr>
-            </a:lvl1pPr>
-          </a:lstStyle>
-          <a:p>
-            <a:r>
-              <a:t>Message</a:t>
-            </a:r>
-          </a:p>
-        </p:txBody>
-      </p:sp>
-      <p:sp>
-        <p:nvSpPr>
           <p:cNvPr id="37" name="Shape 145"/>
           <p:cNvSpPr/>
           <p:nvPr/>
         </p:nvSpPr>
         <p:spPr>
           <a:xfrm>
-            <a:off x="3580505" y="2349726"/>
+            <a:off x="4654397" y="2264662"/>
             <a:ext cx="1765846" cy="279401"/>
           </a:xfrm>
           <a:prstGeom prst="rect">
@@ -3635,7 +3133,7 @@
           </a:ln>
           <a:extLst>
             <a:ext uri="{C572A759-6A51-4108-AA02-DFA0A04FC94B}">
-              <ma14:wrappingTextBoxFlag xmlns:ma14="http://schemas.microsoft.com/office/mac/drawingml/2011/main" val="1"/>
+              <ma14:wrappingTextBoxFlag xmlns="" xmlns:ma14="http://schemas.microsoft.com/office/mac/drawingml/2011/main" val="1"/>
             </a:ext>
           </a:extLst>
         </p:spPr>
@@ -3660,36 +3158,6 @@
           </a:p>
         </p:txBody>
       </p:sp>
-      <p:pic>
-        <p:nvPicPr>
-          <p:cNvPr id="7" name="Picture 6"/>
-          <p:cNvPicPr>
-            <a:picLocks noChangeAspect="1"/>
-          </p:cNvPicPr>
-          <p:nvPr/>
-        </p:nvPicPr>
-        <p:blipFill>
-          <a:blip r:embed="rId5">
-            <a:extLst>
-              <a:ext uri="{28A0092B-C50C-407E-A947-70E740481C1C}">
-                <a14:useLocalDpi xmlns:a14="http://schemas.microsoft.com/office/drawing/2010/main" val="0"/>
-              </a:ext>
-            </a:extLst>
-          </a:blip>
-          <a:stretch>
-            <a:fillRect/>
-          </a:stretch>
-        </p:blipFill>
-        <p:spPr>
-          <a:xfrm flipV="1">
-            <a:off x="6525362" y="1627835"/>
-            <a:ext cx="1270000" cy="1270000"/>
-          </a:xfrm>
-          <a:prstGeom prst="rect">
-            <a:avLst/>
-          </a:prstGeom>
-        </p:spPr>
-      </p:pic>
       <p:cxnSp>
         <p:nvCxnSpPr>
           <p:cNvPr id="9" name="Elbow Connector 8"/>
@@ -3698,7 +3166,7 @@
         </p:nvCxnSpPr>
         <p:spPr>
           <a:xfrm>
-            <a:off x="5451466" y="1776533"/>
+            <a:off x="6525358" y="1691469"/>
             <a:ext cx="1256162" cy="517831"/>
           </a:xfrm>
           <a:prstGeom prst="bentConnector3">
@@ -3732,36 +3200,6 @@
           <a:fontRef idx="none"/>
         </p:style>
       </p:cxnSp>
-      <p:pic>
-        <p:nvPicPr>
-          <p:cNvPr id="34" name="Picture 33"/>
-          <p:cNvPicPr>
-            <a:picLocks noChangeAspect="1"/>
-          </p:cNvPicPr>
-          <p:nvPr/>
-        </p:nvPicPr>
-        <p:blipFill>
-          <a:blip r:embed="rId6">
-            <a:extLst>
-              <a:ext uri="{28A0092B-C50C-407E-A947-70E740481C1C}">
-                <a14:useLocalDpi xmlns:a14="http://schemas.microsoft.com/office/drawing/2010/main" val="0"/>
-              </a:ext>
-            </a:extLst>
-          </a:blip>
-          <a:stretch>
-            <a:fillRect/>
-          </a:stretch>
-        </p:blipFill>
-        <p:spPr>
-          <a:xfrm>
-            <a:off x="4916208" y="1313872"/>
-            <a:ext cx="906675" cy="906675"/>
-          </a:xfrm>
-          <a:prstGeom prst="rect">
-            <a:avLst/>
-          </a:prstGeom>
-        </p:spPr>
-      </p:pic>
       <p:sp>
         <p:nvSpPr>
           <p:cNvPr id="43" name="Shape 125"/>
@@ -3770,7 +3208,7 @@
         </p:nvSpPr>
         <p:spPr>
           <a:xfrm>
-            <a:off x="6597104" y="2674308"/>
+            <a:off x="7670996" y="2589244"/>
             <a:ext cx="1126515" cy="525262"/>
           </a:xfrm>
           <a:prstGeom prst="rect">
@@ -3781,7 +3219,7 @@
           </a:ln>
           <a:extLst>
             <a:ext uri="{C572A759-6A51-4108-AA02-DFA0A04FC94B}">
-              <ma14:wrappingTextBoxFlag xmlns:ma14="http://schemas.microsoft.com/office/mac/drawingml/2011/main" val="1"/>
+              <ma14:wrappingTextBoxFlag xmlns="" xmlns:ma14="http://schemas.microsoft.com/office/mac/drawingml/2011/main" val="1"/>
             </a:ext>
           </a:extLst>
         </p:spPr>
@@ -3802,147 +3240,13 @@
           </a:lstStyle>
           <a:p>
             <a:r>
-              <a:rPr lang="en-US" dirty="0" smtClean="0"/>
+              <a:rPr lang="en-US" dirty="0"/>
               <a:t>Raw Records</a:t>
             </a:r>
             <a:endParaRPr dirty="0"/>
           </a:p>
         </p:txBody>
       </p:sp>
-      <p:grpSp>
-        <p:nvGrpSpPr>
-          <p:cNvPr id="12" name="Group 11"/>
-          <p:cNvGrpSpPr/>
-          <p:nvPr/>
-        </p:nvGrpSpPr>
-        <p:grpSpPr>
-          <a:xfrm>
-            <a:off x="4454328" y="790829"/>
-            <a:ext cx="344594" cy="386100"/>
-            <a:chOff x="6668853" y="4017787"/>
-            <a:chExt cx="344594" cy="386100"/>
-          </a:xfrm>
-        </p:grpSpPr>
-        <p:sp>
-          <p:nvSpPr>
-            <p:cNvPr id="44" name="Shape 143"/>
-            <p:cNvSpPr/>
-            <p:nvPr/>
-          </p:nvSpPr>
-          <p:spPr>
-            <a:xfrm>
-              <a:off x="6668853" y="4038540"/>
-              <a:ext cx="344594" cy="344594"/>
-            </a:xfrm>
-            <a:prstGeom prst="ellipse">
-              <a:avLst/>
-            </a:prstGeom>
-            <a:solidFill>
-              <a:srgbClr val="E77D3A"/>
-            </a:solidFill>
-            <a:ln w="12700">
-              <a:solidFill>
-                <a:srgbClr val="C3682E"/>
-              </a:solidFill>
-              <a:miter lim="400000"/>
-            </a:ln>
-          </p:spPr>
-          <p:txBody>
-            <a:bodyPr lIns="50800" tIns="50800" rIns="50800" bIns="50800" anchor="ctr"/>
-            <a:lstStyle/>
-            <a:p>
-              <a:pPr>
-                <a:defRPr sz="1000" b="1">
-                  <a:solidFill>
-                    <a:srgbClr val="FFFFFF"/>
-                  </a:solidFill>
-                  <a:latin typeface="Helvetica"/>
-                  <a:ea typeface="Helvetica"/>
-                  <a:cs typeface="Helvetica"/>
-                  <a:sym typeface="Helvetica"/>
-                </a:defRPr>
-              </a:pPr>
-              <a:endParaRPr/>
-            </a:p>
-          </p:txBody>
-        </p:sp>
-        <p:sp>
-          <p:nvSpPr>
-            <p:cNvPr id="45" name="Shape 144"/>
-            <p:cNvSpPr/>
-            <p:nvPr/>
-          </p:nvSpPr>
-          <p:spPr>
-            <a:xfrm>
-              <a:off x="6711527" y="4017787"/>
-              <a:ext cx="259245" cy="386100"/>
-            </a:xfrm>
-            <a:prstGeom prst="rect">
-              <a:avLst/>
-            </a:prstGeom>
-            <a:ln w="12700">
-              <a:miter lim="400000"/>
-            </a:ln>
-            <a:extLst>
-              <a:ext uri="{C572A759-6A51-4108-AA02-DFA0A04FC94B}">
-                <ma14:wrappingTextBoxFlag xmlns:ma14="http://schemas.microsoft.com/office/mac/drawingml/2011/main" val="1"/>
-              </a:ext>
-            </a:extLst>
-          </p:spPr>
-          <p:txBody>
-            <a:bodyPr lIns="50800" tIns="50800" rIns="50800" bIns="50800" anchor="ctr"/>
-            <a:lstStyle>
-              <a:lvl1pPr>
-                <a:defRPr sz="1500" b="1">
-                  <a:solidFill>
-                    <a:srgbClr val="FFFFFF"/>
-                  </a:solidFill>
-                  <a:latin typeface="Helvetica"/>
-                  <a:ea typeface="Helvetica"/>
-                  <a:cs typeface="Helvetica"/>
-                  <a:sym typeface="Helvetica"/>
-                </a:defRPr>
-              </a:lvl1pPr>
-            </a:lstStyle>
-            <a:p>
-              <a:r>
-                <a:rPr dirty="0"/>
-                <a:t>3</a:t>
-              </a:r>
-            </a:p>
-          </p:txBody>
-        </p:sp>
-      </p:grpSp>
-      <p:pic>
-        <p:nvPicPr>
-          <p:cNvPr id="48" name="Picture 47"/>
-          <p:cNvPicPr>
-            <a:picLocks noChangeAspect="1"/>
-          </p:cNvPicPr>
-          <p:nvPr/>
-        </p:nvPicPr>
-        <p:blipFill>
-          <a:blip r:embed="rId5">
-            <a:extLst>
-              <a:ext uri="{28A0092B-C50C-407E-A947-70E740481C1C}">
-                <a14:useLocalDpi xmlns:a14="http://schemas.microsoft.com/office/drawing/2010/main" val="0"/>
-              </a:ext>
-            </a:extLst>
-          </a:blip>
-          <a:stretch>
-            <a:fillRect/>
-          </a:stretch>
-        </p:blipFill>
-        <p:spPr>
-          <a:xfrm flipV="1">
-            <a:off x="7834722" y="1643812"/>
-            <a:ext cx="1270000" cy="1270000"/>
-          </a:xfrm>
-          <a:prstGeom prst="rect">
-            <a:avLst/>
-          </a:prstGeom>
-        </p:spPr>
-      </p:pic>
       <p:sp>
         <p:nvSpPr>
           <p:cNvPr id="49" name="Shape 125"/>
@@ -3951,7 +3255,7 @@
         </p:nvSpPr>
         <p:spPr>
           <a:xfrm>
-            <a:off x="7836625" y="2690285"/>
+            <a:off x="8971887" y="2605221"/>
             <a:ext cx="1266194" cy="525262"/>
           </a:xfrm>
           <a:prstGeom prst="rect">
@@ -3962,7 +3266,7 @@
           </a:ln>
           <a:extLst>
             <a:ext uri="{C572A759-6A51-4108-AA02-DFA0A04FC94B}">
-              <ma14:wrappingTextBoxFlag xmlns:ma14="http://schemas.microsoft.com/office/mac/drawingml/2011/main" val="1"/>
+              <ma14:wrappingTextBoxFlag xmlns="" xmlns:ma14="http://schemas.microsoft.com/office/mac/drawingml/2011/main" val="1"/>
             </a:ext>
           </a:extLst>
         </p:spPr>
@@ -3983,7 +3287,7 @@
           </a:lstStyle>
           <a:p>
             <a:r>
-              <a:rPr lang="en-US" dirty="0" smtClean="0"/>
+              <a:rPr lang="en-US" dirty="0"/>
               <a:t>Processed Records</a:t>
             </a:r>
             <a:endParaRPr dirty="0"/>
@@ -3998,7 +3302,7 @@
         </p:nvCxnSpPr>
         <p:spPr>
           <a:xfrm>
-            <a:off x="8531361" y="954511"/>
+            <a:off x="9605253" y="869447"/>
             <a:ext cx="0" cy="928802"/>
           </a:xfrm>
           <a:prstGeom prst="straightConnector1">
@@ -4037,7 +3341,7 @@
         </p:nvCxnSpPr>
         <p:spPr>
           <a:xfrm>
-            <a:off x="7315515" y="954511"/>
+            <a:off x="8389407" y="869447"/>
             <a:ext cx="1215846" cy="0"/>
           </a:xfrm>
           <a:prstGeom prst="line">
@@ -4076,7 +3380,7 @@
         </p:nvCxnSpPr>
         <p:spPr>
           <a:xfrm>
-            <a:off x="5611063" y="954511"/>
+            <a:off x="6684955" y="869447"/>
             <a:ext cx="1324776" cy="0"/>
           </a:xfrm>
           <a:prstGeom prst="line">
@@ -4106,276 +3410,6 @@
           <a:fontRef idx="none"/>
         </p:style>
       </p:cxnSp>
-      <p:pic>
-        <p:nvPicPr>
-          <p:cNvPr id="6" name="Picture 5"/>
-          <p:cNvPicPr>
-            <a:picLocks noChangeAspect="1"/>
-          </p:cNvPicPr>
-          <p:nvPr/>
-        </p:nvPicPr>
-        <p:blipFill>
-          <a:blip r:embed="rId6">
-            <a:extLst>
-              <a:ext uri="{28A0092B-C50C-407E-A947-70E740481C1C}">
-                <a14:useLocalDpi xmlns:a14="http://schemas.microsoft.com/office/drawing/2010/main" val="0"/>
-              </a:ext>
-            </a:extLst>
-          </a:blip>
-          <a:stretch>
-            <a:fillRect/>
-          </a:stretch>
-        </p:blipFill>
-        <p:spPr>
-          <a:xfrm>
-            <a:off x="4916208" y="464265"/>
-            <a:ext cx="980492" cy="980492"/>
-          </a:xfrm>
-          <a:prstGeom prst="rect">
-            <a:avLst/>
-          </a:prstGeom>
-        </p:spPr>
-      </p:pic>
-      <p:pic>
-        <p:nvPicPr>
-          <p:cNvPr id="13" name="Picture 12"/>
-          <p:cNvPicPr>
-            <a:picLocks noChangeAspect="1"/>
-          </p:cNvPicPr>
-          <p:nvPr/>
-        </p:nvPicPr>
-        <p:blipFill>
-          <a:blip r:embed="rId7">
-            <a:extLst>
-              <a:ext uri="{28A0092B-C50C-407E-A947-70E740481C1C}">
-                <a14:useLocalDpi xmlns:a14="http://schemas.microsoft.com/office/drawing/2010/main" val="0"/>
-              </a:ext>
-            </a:extLst>
-          </a:blip>
-          <a:stretch>
-            <a:fillRect/>
-          </a:stretch>
-        </p:blipFill>
-        <p:spPr>
-          <a:xfrm>
-            <a:off x="6525362" y="319511"/>
-            <a:ext cx="1270000" cy="1270000"/>
-          </a:xfrm>
-          <a:prstGeom prst="rect">
-            <a:avLst/>
-          </a:prstGeom>
-        </p:spPr>
-      </p:pic>
-      <p:grpSp>
-        <p:nvGrpSpPr>
-          <p:cNvPr id="68" name="Group 67"/>
-          <p:cNvGrpSpPr/>
-          <p:nvPr/>
-        </p:nvGrpSpPr>
-        <p:grpSpPr>
-          <a:xfrm>
-            <a:off x="6316860" y="454747"/>
-            <a:ext cx="344594" cy="386100"/>
-            <a:chOff x="6668853" y="4017787"/>
-            <a:chExt cx="344594" cy="386100"/>
-          </a:xfrm>
-        </p:grpSpPr>
-        <p:sp>
-          <p:nvSpPr>
-            <p:cNvPr id="69" name="Shape 143"/>
-            <p:cNvSpPr/>
-            <p:nvPr/>
-          </p:nvSpPr>
-          <p:spPr>
-            <a:xfrm>
-              <a:off x="6668853" y="4038540"/>
-              <a:ext cx="344594" cy="344594"/>
-            </a:xfrm>
-            <a:prstGeom prst="ellipse">
-              <a:avLst/>
-            </a:prstGeom>
-            <a:solidFill>
-              <a:srgbClr val="E77D3A"/>
-            </a:solidFill>
-            <a:ln w="12700">
-              <a:solidFill>
-                <a:srgbClr val="C3682E"/>
-              </a:solidFill>
-              <a:miter lim="400000"/>
-            </a:ln>
-          </p:spPr>
-          <p:txBody>
-            <a:bodyPr lIns="50800" tIns="50800" rIns="50800" bIns="50800" anchor="ctr"/>
-            <a:lstStyle/>
-            <a:p>
-              <a:pPr>
-                <a:defRPr sz="1000" b="1">
-                  <a:solidFill>
-                    <a:srgbClr val="FFFFFF"/>
-                  </a:solidFill>
-                  <a:latin typeface="Helvetica"/>
-                  <a:ea typeface="Helvetica"/>
-                  <a:cs typeface="Helvetica"/>
-                  <a:sym typeface="Helvetica"/>
-                </a:defRPr>
-              </a:pPr>
-              <a:endParaRPr/>
-            </a:p>
-          </p:txBody>
-        </p:sp>
-        <p:sp>
-          <p:nvSpPr>
-            <p:cNvPr id="70" name="Shape 144"/>
-            <p:cNvSpPr/>
-            <p:nvPr/>
-          </p:nvSpPr>
-          <p:spPr>
-            <a:xfrm>
-              <a:off x="6711527" y="4017787"/>
-              <a:ext cx="259245" cy="386100"/>
-            </a:xfrm>
-            <a:prstGeom prst="rect">
-              <a:avLst/>
-            </a:prstGeom>
-            <a:ln w="12700">
-              <a:miter lim="400000"/>
-            </a:ln>
-            <a:extLst>
-              <a:ext uri="{C572A759-6A51-4108-AA02-DFA0A04FC94B}">
-                <ma14:wrappingTextBoxFlag xmlns:ma14="http://schemas.microsoft.com/office/mac/drawingml/2011/main" val="1"/>
-              </a:ext>
-            </a:extLst>
-          </p:spPr>
-          <p:txBody>
-            <a:bodyPr lIns="50800" tIns="50800" rIns="50800" bIns="50800" anchor="ctr"/>
-            <a:lstStyle>
-              <a:lvl1pPr>
-                <a:defRPr sz="1500" b="1">
-                  <a:solidFill>
-                    <a:srgbClr val="FFFFFF"/>
-                  </a:solidFill>
-                  <a:latin typeface="Helvetica"/>
-                  <a:ea typeface="Helvetica"/>
-                  <a:cs typeface="Helvetica"/>
-                  <a:sym typeface="Helvetica"/>
-                </a:defRPr>
-              </a:lvl1pPr>
-            </a:lstStyle>
-            <a:p>
-              <a:r>
-                <a:rPr lang="en-US" dirty="0" smtClean="0"/>
-                <a:t>4</a:t>
-              </a:r>
-              <a:endParaRPr dirty="0"/>
-            </a:p>
-          </p:txBody>
-        </p:sp>
-      </p:grpSp>
-      <p:grpSp>
-        <p:nvGrpSpPr>
-          <p:cNvPr id="71" name="Group 70"/>
-          <p:cNvGrpSpPr/>
-          <p:nvPr/>
-        </p:nvGrpSpPr>
-        <p:grpSpPr>
-          <a:xfrm>
-            <a:off x="6316860" y="1731369"/>
-            <a:ext cx="344594" cy="386100"/>
-            <a:chOff x="6668853" y="4017787"/>
-            <a:chExt cx="344594" cy="386100"/>
-          </a:xfrm>
-        </p:grpSpPr>
-        <p:sp>
-          <p:nvSpPr>
-            <p:cNvPr id="72" name="Shape 143"/>
-            <p:cNvSpPr/>
-            <p:nvPr/>
-          </p:nvSpPr>
-          <p:spPr>
-            <a:xfrm>
-              <a:off x="6668853" y="4038540"/>
-              <a:ext cx="344594" cy="344594"/>
-            </a:xfrm>
-            <a:prstGeom prst="ellipse">
-              <a:avLst/>
-            </a:prstGeom>
-            <a:solidFill>
-              <a:srgbClr val="E77D3A"/>
-            </a:solidFill>
-            <a:ln w="12700">
-              <a:solidFill>
-                <a:srgbClr val="C3682E"/>
-              </a:solidFill>
-              <a:miter lim="400000"/>
-            </a:ln>
-          </p:spPr>
-          <p:txBody>
-            <a:bodyPr lIns="50800" tIns="50800" rIns="50800" bIns="50800" anchor="ctr"/>
-            <a:lstStyle/>
-            <a:p>
-              <a:pPr>
-                <a:defRPr sz="1000" b="1">
-                  <a:solidFill>
-                    <a:srgbClr val="FFFFFF"/>
-                  </a:solidFill>
-                  <a:latin typeface="Helvetica"/>
-                  <a:ea typeface="Helvetica"/>
-                  <a:cs typeface="Helvetica"/>
-                  <a:sym typeface="Helvetica"/>
-                </a:defRPr>
-              </a:pPr>
-              <a:endParaRPr/>
-            </a:p>
-          </p:txBody>
-        </p:sp>
-        <p:sp>
-          <p:nvSpPr>
-            <p:cNvPr id="73" name="Shape 144"/>
-            <p:cNvSpPr/>
-            <p:nvPr/>
-          </p:nvSpPr>
-          <p:spPr>
-            <a:xfrm>
-              <a:off x="6711527" y="4017787"/>
-              <a:ext cx="259245" cy="386100"/>
-            </a:xfrm>
-            <a:prstGeom prst="rect">
-              <a:avLst/>
-            </a:prstGeom>
-            <a:ln w="12700">
-              <a:miter lim="400000"/>
-            </a:ln>
-            <a:extLst>
-              <a:ext uri="{C572A759-6A51-4108-AA02-DFA0A04FC94B}">
-                <ma14:wrappingTextBoxFlag xmlns:ma14="http://schemas.microsoft.com/office/mac/drawingml/2011/main" val="1"/>
-              </a:ext>
-            </a:extLst>
-          </p:spPr>
-          <p:txBody>
-            <a:bodyPr lIns="50800" tIns="50800" rIns="50800" bIns="50800" anchor="ctr"/>
-            <a:lstStyle>
-              <a:lvl1pPr>
-                <a:defRPr sz="1500" b="1">
-                  <a:solidFill>
-                    <a:srgbClr val="FFFFFF"/>
-                  </a:solidFill>
-                  <a:latin typeface="Helvetica"/>
-                  <a:ea typeface="Helvetica"/>
-                  <a:cs typeface="Helvetica"/>
-                  <a:sym typeface="Helvetica"/>
-                </a:defRPr>
-              </a:lvl1pPr>
-            </a:lstStyle>
-            <a:p>
-              <a:r>
-                <a:rPr lang="en-US" dirty="0" smtClean="0"/>
-                <a:t>5</a:t>
-              </a:r>
-              <a:endParaRPr dirty="0"/>
-            </a:p>
-          </p:txBody>
-        </p:sp>
-      </p:grpSp>
       <p:sp>
         <p:nvSpPr>
           <p:cNvPr id="74" name="Shape 145"/>
@@ -4384,7 +3418,7 @@
         </p:nvSpPr>
         <p:spPr>
           <a:xfrm>
-            <a:off x="3580505" y="2586173"/>
+            <a:off x="4654397" y="2501109"/>
             <a:ext cx="2426946" cy="287258"/>
           </a:xfrm>
           <a:prstGeom prst="rect">
@@ -4395,7 +3429,7 @@
           </a:ln>
           <a:extLst>
             <a:ext uri="{C572A759-6A51-4108-AA02-DFA0A04FC94B}">
-              <ma14:wrappingTextBoxFlag xmlns:ma14="http://schemas.microsoft.com/office/mac/drawingml/2011/main" val="1"/>
+              <ma14:wrappingTextBoxFlag xmlns="" xmlns:ma14="http://schemas.microsoft.com/office/mac/drawingml/2011/main" val="1"/>
             </a:ext>
           </a:extLst>
         </p:spPr>
@@ -4415,257 +3449,17 @@
           </a:lstStyle>
           <a:p>
             <a:r>
-              <a:rPr dirty="0" smtClean="0"/>
+              <a:rPr dirty="0"/>
               <a:t>deviceID/telemetry</a:t>
             </a:r>
             <a:r>
-              <a:rPr lang="en-US" dirty="0" smtClean="0"/>
+              <a:rPr lang="en-US" dirty="0"/>
               <a:t>/replay</a:t>
             </a:r>
             <a:endParaRPr dirty="0"/>
           </a:p>
         </p:txBody>
       </p:sp>
-      <p:grpSp>
-        <p:nvGrpSpPr>
-          <p:cNvPr id="80" name="Group 79"/>
-          <p:cNvGrpSpPr/>
-          <p:nvPr/>
-        </p:nvGrpSpPr>
-        <p:grpSpPr>
-          <a:xfrm>
-            <a:off x="2584049" y="734134"/>
-            <a:ext cx="344594" cy="386100"/>
-            <a:chOff x="6668853" y="4017787"/>
-            <a:chExt cx="344594" cy="386100"/>
-          </a:xfrm>
-        </p:grpSpPr>
-        <p:sp>
-          <p:nvSpPr>
-            <p:cNvPr id="81" name="Shape 143"/>
-            <p:cNvSpPr/>
-            <p:nvPr/>
-          </p:nvSpPr>
-          <p:spPr>
-            <a:xfrm>
-              <a:off x="6668853" y="4038540"/>
-              <a:ext cx="344594" cy="344594"/>
-            </a:xfrm>
-            <a:prstGeom prst="ellipse">
-              <a:avLst/>
-            </a:prstGeom>
-            <a:solidFill>
-              <a:srgbClr val="E77D3A"/>
-            </a:solidFill>
-            <a:ln w="12700">
-              <a:solidFill>
-                <a:srgbClr val="C3682E"/>
-              </a:solidFill>
-              <a:miter lim="400000"/>
-            </a:ln>
-          </p:spPr>
-          <p:txBody>
-            <a:bodyPr lIns="50800" tIns="50800" rIns="50800" bIns="50800" anchor="ctr"/>
-            <a:lstStyle/>
-            <a:p>
-              <a:pPr>
-                <a:defRPr sz="1000" b="1">
-                  <a:solidFill>
-                    <a:srgbClr val="FFFFFF"/>
-                  </a:solidFill>
-                  <a:latin typeface="Helvetica"/>
-                  <a:ea typeface="Helvetica"/>
-                  <a:cs typeface="Helvetica"/>
-                  <a:sym typeface="Helvetica"/>
-                </a:defRPr>
-              </a:pPr>
-              <a:endParaRPr/>
-            </a:p>
-          </p:txBody>
-        </p:sp>
-        <p:sp>
-          <p:nvSpPr>
-            <p:cNvPr id="82" name="Shape 144"/>
-            <p:cNvSpPr/>
-            <p:nvPr/>
-          </p:nvSpPr>
-          <p:spPr>
-            <a:xfrm>
-              <a:off x="6711527" y="4017787"/>
-              <a:ext cx="259245" cy="386100"/>
-            </a:xfrm>
-            <a:prstGeom prst="rect">
-              <a:avLst/>
-            </a:prstGeom>
-            <a:ln w="12700">
-              <a:miter lim="400000"/>
-            </a:ln>
-            <a:extLst>
-              <a:ext uri="{C572A759-6A51-4108-AA02-DFA0A04FC94B}">
-                <ma14:wrappingTextBoxFlag xmlns:ma14="http://schemas.microsoft.com/office/mac/drawingml/2011/main" val="1"/>
-              </a:ext>
-            </a:extLst>
-          </p:spPr>
-          <p:txBody>
-            <a:bodyPr lIns="50800" tIns="50800" rIns="50800" bIns="50800" anchor="ctr"/>
-            <a:lstStyle>
-              <a:lvl1pPr>
-                <a:defRPr sz="1500" b="1">
-                  <a:solidFill>
-                    <a:srgbClr val="FFFFFF"/>
-                  </a:solidFill>
-                  <a:latin typeface="Helvetica"/>
-                  <a:ea typeface="Helvetica"/>
-                  <a:cs typeface="Helvetica"/>
-                  <a:sym typeface="Helvetica"/>
-                </a:defRPr>
-              </a:lvl1pPr>
-            </a:lstStyle>
-            <a:p>
-              <a:r>
-                <a:rPr lang="en-US" dirty="0" smtClean="0"/>
-                <a:t>2</a:t>
-              </a:r>
-              <a:endParaRPr dirty="0"/>
-            </a:p>
-          </p:txBody>
-        </p:sp>
-      </p:grpSp>
-      <p:grpSp>
-        <p:nvGrpSpPr>
-          <p:cNvPr id="83" name="Group 82"/>
-          <p:cNvGrpSpPr/>
-          <p:nvPr/>
-        </p:nvGrpSpPr>
-        <p:grpSpPr>
-          <a:xfrm>
-            <a:off x="652467" y="2039261"/>
-            <a:ext cx="344594" cy="386100"/>
-            <a:chOff x="6668853" y="4017787"/>
-            <a:chExt cx="344594" cy="386100"/>
-          </a:xfrm>
-        </p:grpSpPr>
-        <p:sp>
-          <p:nvSpPr>
-            <p:cNvPr id="84" name="Shape 143"/>
-            <p:cNvSpPr/>
-            <p:nvPr/>
-          </p:nvSpPr>
-          <p:spPr>
-            <a:xfrm>
-              <a:off x="6668853" y="4038540"/>
-              <a:ext cx="344594" cy="344594"/>
-            </a:xfrm>
-            <a:prstGeom prst="ellipse">
-              <a:avLst/>
-            </a:prstGeom>
-            <a:solidFill>
-              <a:srgbClr val="E77D3A"/>
-            </a:solidFill>
-            <a:ln w="12700">
-              <a:solidFill>
-                <a:srgbClr val="C3682E"/>
-              </a:solidFill>
-              <a:miter lim="400000"/>
-            </a:ln>
-          </p:spPr>
-          <p:txBody>
-            <a:bodyPr lIns="50800" tIns="50800" rIns="50800" bIns="50800" anchor="ctr"/>
-            <a:lstStyle/>
-            <a:p>
-              <a:pPr>
-                <a:defRPr sz="1000" b="1">
-                  <a:solidFill>
-                    <a:srgbClr val="FFFFFF"/>
-                  </a:solidFill>
-                  <a:latin typeface="Helvetica"/>
-                  <a:ea typeface="Helvetica"/>
-                  <a:cs typeface="Helvetica"/>
-                  <a:sym typeface="Helvetica"/>
-                </a:defRPr>
-              </a:pPr>
-              <a:endParaRPr/>
-            </a:p>
-          </p:txBody>
-        </p:sp>
-        <p:sp>
-          <p:nvSpPr>
-            <p:cNvPr id="85" name="Shape 144"/>
-            <p:cNvSpPr/>
-            <p:nvPr/>
-          </p:nvSpPr>
-          <p:spPr>
-            <a:xfrm>
-              <a:off x="6711527" y="4017787"/>
-              <a:ext cx="259245" cy="386100"/>
-            </a:xfrm>
-            <a:prstGeom prst="rect">
-              <a:avLst/>
-            </a:prstGeom>
-            <a:ln w="12700">
-              <a:miter lim="400000"/>
-            </a:ln>
-            <a:extLst>
-              <a:ext uri="{C572A759-6A51-4108-AA02-DFA0A04FC94B}">
-                <ma14:wrappingTextBoxFlag xmlns:ma14="http://schemas.microsoft.com/office/mac/drawingml/2011/main" val="1"/>
-              </a:ext>
-            </a:extLst>
-          </p:spPr>
-          <p:txBody>
-            <a:bodyPr lIns="50800" tIns="50800" rIns="50800" bIns="50800" anchor="ctr"/>
-            <a:lstStyle>
-              <a:lvl1pPr>
-                <a:defRPr sz="1500" b="1">
-                  <a:solidFill>
-                    <a:srgbClr val="FFFFFF"/>
-                  </a:solidFill>
-                  <a:latin typeface="Helvetica"/>
-                  <a:ea typeface="Helvetica"/>
-                  <a:cs typeface="Helvetica"/>
-                  <a:sym typeface="Helvetica"/>
-                </a:defRPr>
-              </a:lvl1pPr>
-            </a:lstStyle>
-            <a:p>
-              <a:r>
-                <a:rPr lang="en-US" dirty="0"/>
-                <a:t>1</a:t>
-              </a:r>
-              <a:endParaRPr dirty="0"/>
-            </a:p>
-          </p:txBody>
-        </p:sp>
-      </p:grpSp>
-      <p:pic>
-        <p:nvPicPr>
-          <p:cNvPr id="39" name="Picture 38"/>
-          <p:cNvPicPr>
-            <a:picLocks noChangeAspect="1"/>
-          </p:cNvPicPr>
-          <p:nvPr/>
-        </p:nvPicPr>
-        <p:blipFill>
-          <a:blip r:embed="rId8">
-            <a:extLst>
-              <a:ext uri="{28A0092B-C50C-407E-A947-70E740481C1C}">
-                <a14:useLocalDpi xmlns:a14="http://schemas.microsoft.com/office/drawing/2010/main" val="0"/>
-              </a:ext>
-            </a:extLst>
-          </a:blip>
-          <a:stretch>
-            <a:fillRect/>
-          </a:stretch>
-        </p:blipFill>
-        <p:spPr>
-          <a:xfrm flipV="1">
-            <a:off x="5001453" y="2894823"/>
-            <a:ext cx="1270000" cy="1270000"/>
-          </a:xfrm>
-          <a:prstGeom prst="rect">
-            <a:avLst/>
-          </a:prstGeom>
-        </p:spPr>
-      </p:pic>
       <p:sp>
         <p:nvSpPr>
           <p:cNvPr id="87" name="Shape 125"/>
@@ -4674,7 +3468,7 @@
         </p:nvSpPr>
         <p:spPr>
           <a:xfrm>
-            <a:off x="4900117" y="3934130"/>
+            <a:off x="5974009" y="3849066"/>
             <a:ext cx="1437502" cy="525262"/>
           </a:xfrm>
           <a:prstGeom prst="rect">
@@ -4685,7 +3479,7 @@
           </a:ln>
           <a:extLst>
             <a:ext uri="{C572A759-6A51-4108-AA02-DFA0A04FC94B}">
-              <ma14:wrappingTextBoxFlag xmlns:ma14="http://schemas.microsoft.com/office/mac/drawingml/2011/main" val="1"/>
+              <ma14:wrappingTextBoxFlag xmlns="" xmlns:ma14="http://schemas.microsoft.com/office/mac/drawingml/2011/main" val="1"/>
             </a:ext>
           </a:extLst>
         </p:spPr>
@@ -4706,118 +3500,13 @@
           </a:lstStyle>
           <a:p>
             <a:r>
-              <a:rPr lang="en-US" dirty="0" smtClean="0"/>
-              <a:t>Replay Application</a:t>
+              <a:rPr lang="en-US" dirty="0"/>
+              <a:t>Replay Component</a:t>
             </a:r>
             <a:endParaRPr dirty="0"/>
           </a:p>
         </p:txBody>
       </p:sp>
-      <p:grpSp>
-        <p:nvGrpSpPr>
-          <p:cNvPr id="88" name="Group 87"/>
-          <p:cNvGrpSpPr/>
-          <p:nvPr/>
-        </p:nvGrpSpPr>
-        <p:grpSpPr>
-          <a:xfrm>
-            <a:off x="4793978" y="3670122"/>
-            <a:ext cx="344594" cy="386100"/>
-            <a:chOff x="6668853" y="4017787"/>
-            <a:chExt cx="344594" cy="386100"/>
-          </a:xfrm>
-        </p:grpSpPr>
-        <p:sp>
-          <p:nvSpPr>
-            <p:cNvPr id="89" name="Shape 143"/>
-            <p:cNvSpPr/>
-            <p:nvPr/>
-          </p:nvSpPr>
-          <p:spPr>
-            <a:xfrm>
-              <a:off x="6668853" y="4038540"/>
-              <a:ext cx="344594" cy="344594"/>
-            </a:xfrm>
-            <a:prstGeom prst="ellipse">
-              <a:avLst/>
-            </a:prstGeom>
-            <a:solidFill>
-              <a:srgbClr val="E77D3A"/>
-            </a:solidFill>
-            <a:ln w="12700">
-              <a:solidFill>
-                <a:srgbClr val="C3682E"/>
-              </a:solidFill>
-              <a:miter lim="400000"/>
-            </a:ln>
-          </p:spPr>
-          <p:txBody>
-            <a:bodyPr lIns="50800" tIns="50800" rIns="50800" bIns="50800" anchor="ctr"/>
-            <a:lstStyle/>
-            <a:p>
-              <a:pPr>
-                <a:defRPr sz="1000" b="1">
-                  <a:solidFill>
-                    <a:srgbClr val="FFFFFF"/>
-                  </a:solidFill>
-                  <a:latin typeface="Helvetica"/>
-                  <a:ea typeface="Helvetica"/>
-                  <a:cs typeface="Helvetica"/>
-                  <a:sym typeface="Helvetica"/>
-                </a:defRPr>
-              </a:pPr>
-              <a:endParaRPr/>
-            </a:p>
-          </p:txBody>
-        </p:sp>
-        <p:sp>
-          <p:nvSpPr>
-            <p:cNvPr id="90" name="Shape 144"/>
-            <p:cNvSpPr/>
-            <p:nvPr/>
-          </p:nvSpPr>
-          <p:spPr>
-            <a:xfrm>
-              <a:off x="6711527" y="4017787"/>
-              <a:ext cx="259245" cy="386100"/>
-            </a:xfrm>
-            <a:prstGeom prst="rect">
-              <a:avLst/>
-            </a:prstGeom>
-            <a:ln w="12700">
-              <a:miter lim="400000"/>
-            </a:ln>
-            <a:extLst>
-              <a:ext uri="{C572A759-6A51-4108-AA02-DFA0A04FC94B}">
-                <ma14:wrappingTextBoxFlag xmlns:ma14="http://schemas.microsoft.com/office/mac/drawingml/2011/main" val="1"/>
-              </a:ext>
-            </a:extLst>
-          </p:spPr>
-          <p:txBody>
-            <a:bodyPr lIns="50800" tIns="50800" rIns="50800" bIns="50800" anchor="ctr"/>
-            <a:lstStyle>
-              <a:lvl1pPr>
-                <a:defRPr sz="1500" b="1">
-                  <a:solidFill>
-                    <a:srgbClr val="FFFFFF"/>
-                  </a:solidFill>
-                  <a:latin typeface="Helvetica"/>
-                  <a:ea typeface="Helvetica"/>
-                  <a:cs typeface="Helvetica"/>
-                  <a:sym typeface="Helvetica"/>
-                </a:defRPr>
-              </a:lvl1pPr>
-            </a:lstStyle>
-            <a:p>
-              <a:r>
-                <a:rPr lang="en-US" dirty="0" smtClean="0"/>
-                <a:t>6</a:t>
-              </a:r>
-              <a:endParaRPr dirty="0"/>
-            </a:p>
-          </p:txBody>
-        </p:sp>
-      </p:grpSp>
       <p:cxnSp>
         <p:nvCxnSpPr>
           <p:cNvPr id="41" name="Straight Arrow Connector 40"/>
@@ -4826,7 +3515,7 @@
         </p:nvCxnSpPr>
         <p:spPr>
           <a:xfrm flipH="1">
-            <a:off x="6036027" y="3529823"/>
+            <a:off x="7109919" y="3444759"/>
             <a:ext cx="1124334" cy="0"/>
           </a:xfrm>
           <a:prstGeom prst="straightConnector1">
@@ -4865,7 +3554,7 @@
         </p:nvCxnSpPr>
         <p:spPr>
           <a:xfrm>
-            <a:off x="7160361" y="3291754"/>
+            <a:off x="8234253" y="3206690"/>
             <a:ext cx="1" cy="238069"/>
           </a:xfrm>
           <a:prstGeom prst="line">
@@ -4904,7 +3593,7 @@
         </p:nvCxnSpPr>
         <p:spPr>
           <a:xfrm flipV="1">
-            <a:off x="4096455" y="3165240"/>
+            <a:off x="5170347" y="3080176"/>
             <a:ext cx="0" cy="397794"/>
           </a:xfrm>
           <a:prstGeom prst="straightConnector1">
@@ -4943,7 +3632,7 @@
         </p:nvCxnSpPr>
         <p:spPr>
           <a:xfrm flipH="1">
-            <a:off x="4096456" y="3529823"/>
+            <a:off x="5170348" y="3444759"/>
             <a:ext cx="1123726" cy="0"/>
           </a:xfrm>
           <a:prstGeom prst="line">
@@ -4974,7 +3663,2050 @@
           <a:fontRef idx="none"/>
         </p:style>
       </p:cxnSp>
+      <p:sp>
+        <p:nvSpPr>
+          <p:cNvPr id="54" name="Shape 124">
+            <a:extLst>
+              <a:ext uri="{FF2B5EF4-FFF2-40B4-BE49-F238E27FC236}">
+                <a16:creationId xmlns:a16="http://schemas.microsoft.com/office/drawing/2014/main" id="{37B9B3B9-ABCD-E34E-8D62-2D3812D18A29}"/>
+              </a:ext>
+            </a:extLst>
+          </p:cNvPr>
+          <p:cNvSpPr/>
+          <p:nvPr/>
+        </p:nvSpPr>
+        <p:spPr>
+          <a:xfrm>
+            <a:off x="1081421" y="2822012"/>
+            <a:ext cx="921933" cy="416988"/>
+          </a:xfrm>
+          <a:prstGeom prst="rect">
+            <a:avLst/>
+          </a:prstGeom>
+          <a:ln w="12700">
+            <a:miter lim="400000"/>
+          </a:ln>
+          <a:extLst>
+            <a:ext uri="{C572A759-6A51-4108-AA02-DFA0A04FC94B}">
+              <ma14:wrappingTextBoxFlag xmlns="" xmlns:ma14="http://schemas.microsoft.com/office/mac/drawingml/2011/main" val="1"/>
+            </a:ext>
+          </a:extLst>
+        </p:spPr>
+        <p:txBody>
+          <a:bodyPr lIns="50800" tIns="50800" rIns="50800" bIns="50800" anchor="ctr"/>
+          <a:lstStyle>
+            <a:lvl1pPr>
+              <a:spcBef>
+                <a:spcPts val="4200"/>
+              </a:spcBef>
+              <a:defRPr sz="1800">
+                <a:latin typeface="Helvetica"/>
+                <a:ea typeface="Helvetica"/>
+                <a:cs typeface="Helvetica"/>
+                <a:sym typeface="Helvetica"/>
+              </a:defRPr>
+            </a:lvl1pPr>
+          </a:lstStyle>
+          <a:p>
+            <a:r>
+              <a:t>Sensor</a:t>
+            </a:r>
+          </a:p>
+        </p:txBody>
+      </p:sp>
+      <p:sp>
+        <p:nvSpPr>
+          <p:cNvPr id="55" name="Shape 125">
+            <a:extLst>
+              <a:ext uri="{FF2B5EF4-FFF2-40B4-BE49-F238E27FC236}">
+                <a16:creationId xmlns:a16="http://schemas.microsoft.com/office/drawing/2014/main" id="{4F61E78B-0BB1-8A4E-9171-08318D0C3C37}"/>
+              </a:ext>
+            </a:extLst>
+          </p:cNvPr>
+          <p:cNvSpPr/>
+          <p:nvPr/>
+        </p:nvSpPr>
+        <p:spPr>
+          <a:xfrm>
+            <a:off x="1110680" y="354515"/>
+            <a:ext cx="894303" cy="416988"/>
+          </a:xfrm>
+          <a:prstGeom prst="rect">
+            <a:avLst/>
+          </a:prstGeom>
+          <a:ln w="12700">
+            <a:miter lim="400000"/>
+          </a:ln>
+          <a:extLst>
+            <a:ext uri="{C572A759-6A51-4108-AA02-DFA0A04FC94B}">
+              <ma14:wrappingTextBoxFlag xmlns="" xmlns:ma14="http://schemas.microsoft.com/office/mac/drawingml/2011/main" val="1"/>
+            </a:ext>
+          </a:extLst>
+        </p:spPr>
+        <p:txBody>
+          <a:bodyPr lIns="50800" tIns="50800" rIns="50800" bIns="50800" anchor="ctr"/>
+          <a:lstStyle>
+            <a:lvl1pPr>
+              <a:spcBef>
+                <a:spcPts val="4200"/>
+              </a:spcBef>
+              <a:defRPr sz="1800">
+                <a:latin typeface="Helvetica"/>
+                <a:ea typeface="Helvetica"/>
+                <a:cs typeface="Helvetica"/>
+                <a:sym typeface="Helvetica"/>
+              </a:defRPr>
+            </a:lvl1pPr>
+          </a:lstStyle>
+          <a:p>
+            <a:r>
+              <a:t>Device</a:t>
+            </a:r>
+          </a:p>
+        </p:txBody>
+      </p:sp>
+      <p:grpSp>
+        <p:nvGrpSpPr>
+          <p:cNvPr id="56" name="Group 139">
+            <a:extLst>
+              <a:ext uri="{FF2B5EF4-FFF2-40B4-BE49-F238E27FC236}">
+                <a16:creationId xmlns:a16="http://schemas.microsoft.com/office/drawing/2014/main" id="{FB2A5AC2-B7A0-9A4C-8D5D-EF632C712BB7}"/>
+              </a:ext>
+            </a:extLst>
+          </p:cNvPr>
+          <p:cNvGrpSpPr/>
+          <p:nvPr/>
+        </p:nvGrpSpPr>
+        <p:grpSpPr>
+          <a:xfrm>
+            <a:off x="1013806" y="1991574"/>
+            <a:ext cx="313706" cy="386100"/>
+            <a:chOff x="0" y="0"/>
+            <a:chExt cx="313705" cy="386098"/>
+          </a:xfrm>
+        </p:grpSpPr>
+        <p:sp>
+          <p:nvSpPr>
+            <p:cNvPr id="57" name="Shape 137">
+              <a:extLst>
+                <a:ext uri="{FF2B5EF4-FFF2-40B4-BE49-F238E27FC236}">
+                  <a16:creationId xmlns:a16="http://schemas.microsoft.com/office/drawing/2014/main" id="{16F57DBE-362A-7D4C-8DEB-16CE487EB764}"/>
+                </a:ext>
+              </a:extLst>
+            </p:cNvPr>
+            <p:cNvSpPr/>
+            <p:nvPr/>
+          </p:nvSpPr>
+          <p:spPr>
+            <a:xfrm>
+              <a:off x="0" y="36196"/>
+              <a:ext cx="313706" cy="313707"/>
+            </a:xfrm>
+            <a:prstGeom prst="ellipse">
+              <a:avLst/>
+            </a:prstGeom>
+            <a:ln/>
+          </p:spPr>
+          <p:style>
+            <a:lnRef idx="2">
+              <a:schemeClr val="accent1">
+                <a:shade val="50000"/>
+              </a:schemeClr>
+            </a:lnRef>
+            <a:fillRef idx="1">
+              <a:schemeClr val="accent1"/>
+            </a:fillRef>
+            <a:effectRef idx="0">
+              <a:schemeClr val="accent1"/>
+            </a:effectRef>
+            <a:fontRef idx="minor">
+              <a:schemeClr val="lt1"/>
+            </a:fontRef>
+          </p:style>
+          <p:txBody>
+            <a:bodyPr wrap="square" lIns="50800" tIns="50800" rIns="50800" bIns="50800" numCol="1" anchor="ctr">
+              <a:noAutofit/>
+            </a:bodyPr>
+            <a:lstStyle/>
+            <a:p>
+              <a:pPr>
+                <a:defRPr sz="1000" b="1">
+                  <a:solidFill>
+                    <a:srgbClr val="FFFFFF"/>
+                  </a:solidFill>
+                  <a:latin typeface="Helvetica"/>
+                  <a:ea typeface="Helvetica"/>
+                  <a:cs typeface="Helvetica"/>
+                  <a:sym typeface="Helvetica"/>
+                </a:defRPr>
+              </a:pPr>
+              <a:endParaRPr/>
+            </a:p>
+          </p:txBody>
+        </p:sp>
+        <p:sp>
+          <p:nvSpPr>
+            <p:cNvPr id="58" name="Shape 138">
+              <a:extLst>
+                <a:ext uri="{FF2B5EF4-FFF2-40B4-BE49-F238E27FC236}">
+                  <a16:creationId xmlns:a16="http://schemas.microsoft.com/office/drawing/2014/main" id="{67AF445F-BD27-2B4A-BF34-E8DF293C771F}"/>
+                </a:ext>
+              </a:extLst>
+            </p:cNvPr>
+            <p:cNvSpPr/>
+            <p:nvPr/>
+          </p:nvSpPr>
+          <p:spPr>
+            <a:xfrm>
+              <a:off x="27230" y="0"/>
+              <a:ext cx="259245" cy="386099"/>
+            </a:xfrm>
+            <a:prstGeom prst="rect">
+              <a:avLst/>
+            </a:prstGeom>
+            <a:noFill/>
+            <a:ln w="12700" cap="flat">
+              <a:noFill/>
+              <a:miter lim="400000"/>
+            </a:ln>
+            <a:effectLst/>
+            <a:extLst>
+              <a:ext uri="{C572A759-6A51-4108-AA02-DFA0A04FC94B}">
+                <ma14:wrappingTextBoxFlag xmlns="" xmlns:ma14="http://schemas.microsoft.com/office/mac/drawingml/2011/main" val="1"/>
+              </a:ext>
+            </a:extLst>
+          </p:spPr>
+          <p:txBody>
+            <a:bodyPr wrap="square" lIns="50800" tIns="50800" rIns="50800" bIns="50800" numCol="1" anchor="ctr">
+              <a:noAutofit/>
+            </a:bodyPr>
+            <a:lstStyle>
+              <a:lvl1pPr>
+                <a:defRPr sz="1500" b="1">
+                  <a:solidFill>
+                    <a:srgbClr val="FFFFFF"/>
+                  </a:solidFill>
+                  <a:latin typeface="Helvetica"/>
+                  <a:ea typeface="Helvetica"/>
+                  <a:cs typeface="Helvetica"/>
+                  <a:sym typeface="Helvetica"/>
+                </a:defRPr>
+              </a:lvl1pPr>
+            </a:lstStyle>
+            <a:p>
+              <a:r>
+                <a:t>1</a:t>
+              </a:r>
+            </a:p>
+          </p:txBody>
+        </p:sp>
+      </p:grpSp>
+      <p:pic>
+        <p:nvPicPr>
+          <p:cNvPr id="59" name="Graphic 58">
+            <a:extLst>
+              <a:ext uri="{FF2B5EF4-FFF2-40B4-BE49-F238E27FC236}">
+                <a16:creationId xmlns:a16="http://schemas.microsoft.com/office/drawing/2014/main" id="{0460D933-63D1-9E48-8463-67B282CE95B2}"/>
+              </a:ext>
+            </a:extLst>
+          </p:cNvPr>
+          <p:cNvPicPr>
+            <a:picLocks noChangeAspect="1"/>
+          </p:cNvPicPr>
+          <p:nvPr/>
+        </p:nvPicPr>
+        <p:blipFill>
+          <a:blip r:embed="rId2">
+            <a:extLst>
+              <a:ext uri="{96DAC541-7B7A-43D3-8B79-37D633B846F1}">
+                <asvg:svgBlip xmlns:asvg="http://schemas.microsoft.com/office/drawing/2016/SVG/main" r:embed="rId3"/>
+              </a:ext>
+            </a:extLst>
+          </a:blip>
+          <a:stretch>
+            <a:fillRect/>
+          </a:stretch>
+        </p:blipFill>
+        <p:spPr>
+          <a:xfrm>
+            <a:off x="1043310" y="860641"/>
+            <a:ext cx="1005840" cy="1005840"/>
+          </a:xfrm>
+          <a:prstGeom prst="rect">
+            <a:avLst/>
+          </a:prstGeom>
+        </p:spPr>
+      </p:pic>
+      <p:pic>
+        <p:nvPicPr>
+          <p:cNvPr id="60" name="Graphic 59">
+            <a:extLst>
+              <a:ext uri="{FF2B5EF4-FFF2-40B4-BE49-F238E27FC236}">
+                <a16:creationId xmlns:a16="http://schemas.microsoft.com/office/drawing/2014/main" id="{C2BDA4D1-88C3-AF45-904A-3578627704B1}"/>
+              </a:ext>
+            </a:extLst>
+          </p:cNvPr>
+          <p:cNvPicPr>
+            <a:picLocks noChangeAspect="1"/>
+          </p:cNvPicPr>
+          <p:nvPr/>
+        </p:nvPicPr>
+        <p:blipFill rotWithShape="1">
+          <a:blip r:embed="rId4">
+            <a:extLst>
+              <a:ext uri="{96DAC541-7B7A-43D3-8B79-37D633B846F1}">
+                <asvg:svgBlip xmlns:asvg="http://schemas.microsoft.com/office/drawing/2016/SVG/main" r:embed="rId5"/>
+              </a:ext>
+            </a:extLst>
+          </a:blip>
+          <a:srcRect t="69927"/>
+          <a:stretch/>
+        </p:blipFill>
+        <p:spPr>
+          <a:xfrm>
+            <a:off x="938115" y="2456252"/>
+            <a:ext cx="1216231" cy="365760"/>
+          </a:xfrm>
+          <a:prstGeom prst="rect">
+            <a:avLst/>
+          </a:prstGeom>
+        </p:spPr>
+      </p:pic>
+      <p:cxnSp>
+        <p:nvCxnSpPr>
+          <p:cNvPr id="61" name="Straight Connector 60">
+            <a:extLst>
+              <a:ext uri="{FF2B5EF4-FFF2-40B4-BE49-F238E27FC236}">
+                <a16:creationId xmlns:a16="http://schemas.microsoft.com/office/drawing/2014/main" id="{6B06A4B3-AEE6-284A-8BFD-E935D795E6E0}"/>
+              </a:ext>
+            </a:extLst>
+          </p:cNvPr>
+          <p:cNvCxnSpPr>
+            <a:stCxn id="59" idx="2"/>
+            <a:endCxn id="60" idx="0"/>
+          </p:cNvCxnSpPr>
+          <p:nvPr/>
+        </p:nvCxnSpPr>
+        <p:spPr>
+          <a:xfrm>
+            <a:off x="1546230" y="1866481"/>
+            <a:ext cx="1" cy="589771"/>
+          </a:xfrm>
+          <a:prstGeom prst="line">
+            <a:avLst/>
+          </a:prstGeom>
+          <a:noFill/>
+          <a:ln w="38100" cap="flat">
+            <a:solidFill>
+              <a:srgbClr val="000000"/>
+            </a:solidFill>
+            <a:prstDash val="solid"/>
+            <a:miter lim="400000"/>
+          </a:ln>
+          <a:effectLst/>
+          <a:sp3d/>
+        </p:spPr>
+        <p:style>
+          <a:lnRef idx="0">
+            <a:scrgbClr r="0" g="0" b="0"/>
+          </a:lnRef>
+          <a:fillRef idx="0">
+            <a:scrgbClr r="0" g="0" b="0"/>
+          </a:fillRef>
+          <a:effectRef idx="0">
+            <a:scrgbClr r="0" g="0" b="0"/>
+          </a:effectRef>
+          <a:fontRef idx="none"/>
+        </p:style>
+      </p:cxnSp>
+      <p:sp>
+        <p:nvSpPr>
+          <p:cNvPr id="62" name="Shape 120">
+            <a:extLst>
+              <a:ext uri="{FF2B5EF4-FFF2-40B4-BE49-F238E27FC236}">
+                <a16:creationId xmlns:a16="http://schemas.microsoft.com/office/drawing/2014/main" id="{D0D74435-DE74-DF49-80C5-CDB51F075F6C}"/>
+              </a:ext>
+            </a:extLst>
+          </p:cNvPr>
+          <p:cNvSpPr/>
+          <p:nvPr/>
+        </p:nvSpPr>
+        <p:spPr>
+          <a:xfrm flipH="1" flipV="1">
+            <a:off x="2157417" y="1363560"/>
+            <a:ext cx="2156128" cy="1"/>
+          </a:xfrm>
+          <a:prstGeom prst="line">
+            <a:avLst/>
+          </a:prstGeom>
+          <a:ln w="50800">
+            <a:solidFill>
+              <a:srgbClr val="000000"/>
+            </a:solidFill>
+            <a:miter lim="400000"/>
+            <a:headEnd type="stealth"/>
+          </a:ln>
+        </p:spPr>
+        <p:txBody>
+          <a:bodyPr lIns="50800" tIns="50800" rIns="50800" bIns="50800" anchor="ctr"/>
+          <a:lstStyle/>
+          <a:p>
+            <a:pPr>
+              <a:defRPr sz="2400"/>
+            </a:pPr>
+            <a:endParaRPr/>
+          </a:p>
+        </p:txBody>
+      </p:sp>
+      <p:sp>
+        <p:nvSpPr>
+          <p:cNvPr id="63" name="Shape 128">
+            <a:extLst>
+              <a:ext uri="{FF2B5EF4-FFF2-40B4-BE49-F238E27FC236}">
+                <a16:creationId xmlns:a16="http://schemas.microsoft.com/office/drawing/2014/main" id="{BE92C6D3-61A0-0841-9263-45F25835FD95}"/>
+              </a:ext>
+            </a:extLst>
+          </p:cNvPr>
+          <p:cNvSpPr/>
+          <p:nvPr/>
+        </p:nvSpPr>
+        <p:spPr>
+          <a:xfrm>
+            <a:off x="2733034" y="1456224"/>
+            <a:ext cx="818862" cy="339768"/>
+          </a:xfrm>
+          <a:prstGeom prst="rect">
+            <a:avLst/>
+          </a:prstGeom>
+          <a:ln w="12700">
+            <a:miter lim="400000"/>
+          </a:ln>
+          <a:extLst>
+            <a:ext uri="{C572A759-6A51-4108-AA02-DFA0A04FC94B}">
+              <ma14:wrappingTextBoxFlag xmlns="" xmlns:ma14="http://schemas.microsoft.com/office/mac/drawingml/2011/main" val="1"/>
+            </a:ext>
+          </a:extLst>
+        </p:spPr>
+        <p:txBody>
+          <a:bodyPr lIns="50800" tIns="50800" rIns="50800" bIns="50800" anchor="ctr"/>
+          <a:lstStyle>
+            <a:lvl1pPr>
+              <a:spcBef>
+                <a:spcPts val="4200"/>
+              </a:spcBef>
+              <a:defRPr sz="1400">
+                <a:latin typeface="Helvetica"/>
+                <a:ea typeface="Helvetica"/>
+                <a:cs typeface="Helvetica"/>
+                <a:sym typeface="Helvetica"/>
+              </a:defRPr>
+            </a:lvl1pPr>
+          </a:lstStyle>
+          <a:p>
+            <a:r>
+              <a:t>Protocol</a:t>
+            </a:r>
+          </a:p>
+        </p:txBody>
+      </p:sp>
+      <p:sp>
+        <p:nvSpPr>
+          <p:cNvPr id="64" name="Shape 129">
+            <a:extLst>
+              <a:ext uri="{FF2B5EF4-FFF2-40B4-BE49-F238E27FC236}">
+                <a16:creationId xmlns:a16="http://schemas.microsoft.com/office/drawing/2014/main" id="{7FD39937-BB46-674A-AE8F-9EE4C2A10601}"/>
+              </a:ext>
+            </a:extLst>
+          </p:cNvPr>
+          <p:cNvSpPr/>
+          <p:nvPr/>
+        </p:nvSpPr>
+        <p:spPr>
+          <a:xfrm>
+            <a:off x="4330865" y="1168098"/>
+            <a:ext cx="390926" cy="390926"/>
+          </a:xfrm>
+          <a:prstGeom prst="ellipse">
+            <a:avLst/>
+          </a:prstGeom>
+          <a:solidFill>
+            <a:schemeClr val="tx1">
+              <a:lumMod val="75000"/>
+              <a:lumOff val="25000"/>
+            </a:schemeClr>
+          </a:solidFill>
+          <a:ln w="12700">
+            <a:noFill/>
+            <a:miter lim="400000"/>
+          </a:ln>
+        </p:spPr>
+        <p:txBody>
+          <a:bodyPr lIns="50800" tIns="50800" rIns="50800" bIns="50800" anchor="ctr"/>
+          <a:lstStyle/>
+          <a:p>
+            <a:pPr>
+              <a:defRPr sz="2400">
+                <a:solidFill>
+                  <a:srgbClr val="FFFFFF"/>
+                </a:solidFill>
+              </a:defRPr>
+            </a:pPr>
+            <a:endParaRPr/>
+          </a:p>
+        </p:txBody>
+      </p:sp>
+      <p:grpSp>
+        <p:nvGrpSpPr>
+          <p:cNvPr id="65" name="Group 135">
+            <a:extLst>
+              <a:ext uri="{FF2B5EF4-FFF2-40B4-BE49-F238E27FC236}">
+                <a16:creationId xmlns:a16="http://schemas.microsoft.com/office/drawing/2014/main" id="{2286ED4F-9D1D-5942-B4E5-99216998D953}"/>
+              </a:ext>
+            </a:extLst>
+          </p:cNvPr>
+          <p:cNvGrpSpPr/>
+          <p:nvPr/>
+        </p:nvGrpSpPr>
+        <p:grpSpPr>
+          <a:xfrm>
+            <a:off x="2427216" y="1035616"/>
+            <a:ext cx="382033" cy="253092"/>
+            <a:chOff x="0" y="0"/>
+            <a:chExt cx="382032" cy="253090"/>
+          </a:xfrm>
+          <a:solidFill>
+            <a:schemeClr val="tx1">
+              <a:lumMod val="75000"/>
+              <a:lumOff val="25000"/>
+            </a:schemeClr>
+          </a:solidFill>
+        </p:grpSpPr>
+        <p:sp>
+          <p:nvSpPr>
+            <p:cNvPr id="66" name="Shape 132">
+              <a:extLst>
+                <a:ext uri="{FF2B5EF4-FFF2-40B4-BE49-F238E27FC236}">
+                  <a16:creationId xmlns:a16="http://schemas.microsoft.com/office/drawing/2014/main" id="{BA6EDD1C-8BD9-C248-A24B-9CD97C8BD266}"/>
+                </a:ext>
+              </a:extLst>
+            </p:cNvPr>
+            <p:cNvSpPr/>
+            <p:nvPr/>
+          </p:nvSpPr>
+          <p:spPr>
+            <a:xfrm>
+              <a:off x="1816" y="0"/>
+              <a:ext cx="379416" cy="253091"/>
+            </a:xfrm>
+            <a:prstGeom prst="rect">
+              <a:avLst/>
+            </a:prstGeom>
+            <a:grpFill/>
+            <a:ln w="12700" cap="flat">
+              <a:noFill/>
+              <a:miter lim="400000"/>
+            </a:ln>
+            <a:effectLst/>
+          </p:spPr>
+          <p:txBody>
+            <a:bodyPr wrap="square" lIns="50800" tIns="50800" rIns="50800" bIns="50800" numCol="1" anchor="ctr">
+              <a:noAutofit/>
+            </a:bodyPr>
+            <a:lstStyle/>
+            <a:p>
+              <a:pPr>
+                <a:defRPr sz="2400">
+                  <a:solidFill>
+                    <a:srgbClr val="FFFFFF"/>
+                  </a:solidFill>
+                </a:defRPr>
+              </a:pPr>
+              <a:endParaRPr/>
+            </a:p>
+          </p:txBody>
+        </p:sp>
+        <p:sp>
+          <p:nvSpPr>
+            <p:cNvPr id="75" name="Shape 133">
+              <a:extLst>
+                <a:ext uri="{FF2B5EF4-FFF2-40B4-BE49-F238E27FC236}">
+                  <a16:creationId xmlns:a16="http://schemas.microsoft.com/office/drawing/2014/main" id="{86C3C6C5-80DC-7E4F-A857-A4F346EB9711}"/>
+                </a:ext>
+              </a:extLst>
+            </p:cNvPr>
+            <p:cNvSpPr/>
+            <p:nvPr/>
+          </p:nvSpPr>
+          <p:spPr>
+            <a:xfrm flipV="1">
+              <a:off x="198113" y="4121"/>
+              <a:ext cx="183920" cy="117762"/>
+            </a:xfrm>
+            <a:prstGeom prst="line">
+              <a:avLst/>
+            </a:prstGeom>
+            <a:grpFill/>
+            <a:ln w="12700" cap="flat">
+              <a:solidFill>
+                <a:srgbClr val="FFFFFF"/>
+              </a:solidFill>
+              <a:prstDash val="solid"/>
+              <a:miter lim="400000"/>
+            </a:ln>
+            <a:effectLst/>
+          </p:spPr>
+          <p:txBody>
+            <a:bodyPr wrap="square" lIns="50800" tIns="50800" rIns="50800" bIns="50800" numCol="1" anchor="ctr">
+              <a:noAutofit/>
+            </a:bodyPr>
+            <a:lstStyle/>
+            <a:p>
+              <a:pPr>
+                <a:defRPr sz="2400"/>
+              </a:pPr>
+              <a:endParaRPr/>
+            </a:p>
+          </p:txBody>
+        </p:sp>
+        <p:sp>
+          <p:nvSpPr>
+            <p:cNvPr id="76" name="Shape 134">
+              <a:extLst>
+                <a:ext uri="{FF2B5EF4-FFF2-40B4-BE49-F238E27FC236}">
+                  <a16:creationId xmlns:a16="http://schemas.microsoft.com/office/drawing/2014/main" id="{EBF07617-A590-434F-ACCB-4424BEEC01EE}"/>
+                </a:ext>
+              </a:extLst>
+            </p:cNvPr>
+            <p:cNvSpPr/>
+            <p:nvPr/>
+          </p:nvSpPr>
+          <p:spPr>
+            <a:xfrm flipH="1" flipV="1">
+              <a:off x="0" y="4012"/>
+              <a:ext cx="200712" cy="117871"/>
+            </a:xfrm>
+            <a:prstGeom prst="line">
+              <a:avLst/>
+            </a:prstGeom>
+            <a:grpFill/>
+            <a:ln w="12700" cap="flat">
+              <a:solidFill>
+                <a:srgbClr val="FFFFFF"/>
+              </a:solidFill>
+              <a:prstDash val="solid"/>
+              <a:miter lim="400000"/>
+            </a:ln>
+            <a:effectLst/>
+          </p:spPr>
+          <p:txBody>
+            <a:bodyPr wrap="square" lIns="50800" tIns="50800" rIns="50800" bIns="50800" numCol="1" anchor="ctr">
+              <a:noAutofit/>
+            </a:bodyPr>
+            <a:lstStyle/>
+            <a:p>
+              <a:pPr>
+                <a:defRPr sz="2400"/>
+              </a:pPr>
+              <a:endParaRPr/>
+            </a:p>
+          </p:txBody>
+        </p:sp>
+      </p:grpSp>
+      <p:sp>
+        <p:nvSpPr>
+          <p:cNvPr id="77" name="Shape 136">
+            <a:extLst>
+              <a:ext uri="{FF2B5EF4-FFF2-40B4-BE49-F238E27FC236}">
+                <a16:creationId xmlns:a16="http://schemas.microsoft.com/office/drawing/2014/main" id="{A82E9075-F908-234B-B164-54F8690CEF84}"/>
+              </a:ext>
+            </a:extLst>
+          </p:cNvPr>
+          <p:cNvSpPr/>
+          <p:nvPr/>
+        </p:nvSpPr>
+        <p:spPr>
+          <a:xfrm>
+            <a:off x="2172740" y="699184"/>
+            <a:ext cx="890985" cy="339768"/>
+          </a:xfrm>
+          <a:prstGeom prst="rect">
+            <a:avLst/>
+          </a:prstGeom>
+          <a:ln w="12700">
+            <a:miter lim="400000"/>
+          </a:ln>
+          <a:extLst>
+            <a:ext uri="{C572A759-6A51-4108-AA02-DFA0A04FC94B}">
+              <ma14:wrappingTextBoxFlag xmlns="" xmlns:ma14="http://schemas.microsoft.com/office/mac/drawingml/2011/main" val="1"/>
+            </a:ext>
+          </a:extLst>
+        </p:spPr>
+        <p:txBody>
+          <a:bodyPr lIns="50800" tIns="50800" rIns="50800" bIns="50800" anchor="ctr"/>
+          <a:lstStyle>
+            <a:lvl1pPr>
+              <a:spcBef>
+                <a:spcPts val="4200"/>
+              </a:spcBef>
+              <a:defRPr sz="1400">
+                <a:latin typeface="Helvetica"/>
+                <a:ea typeface="Helvetica"/>
+                <a:cs typeface="Helvetica"/>
+                <a:sym typeface="Helvetica"/>
+              </a:defRPr>
+            </a:lvl1pPr>
+          </a:lstStyle>
+          <a:p>
+            <a:r>
+              <a:rPr dirty="0"/>
+              <a:t>Message</a:t>
+            </a:r>
+          </a:p>
+        </p:txBody>
+      </p:sp>
+      <p:grpSp>
+        <p:nvGrpSpPr>
+          <p:cNvPr id="78" name="Group 142">
+            <a:extLst>
+              <a:ext uri="{FF2B5EF4-FFF2-40B4-BE49-F238E27FC236}">
+                <a16:creationId xmlns:a16="http://schemas.microsoft.com/office/drawing/2014/main" id="{71BA4D59-3F04-FB41-A2BF-8FA153EACE92}"/>
+              </a:ext>
+            </a:extLst>
+          </p:cNvPr>
+          <p:cNvGrpSpPr/>
+          <p:nvPr/>
+        </p:nvGrpSpPr>
+        <p:grpSpPr>
+          <a:xfrm>
+            <a:off x="3074430" y="676018"/>
+            <a:ext cx="313706" cy="386100"/>
+            <a:chOff x="0" y="0"/>
+            <a:chExt cx="313705" cy="386098"/>
+          </a:xfrm>
+        </p:grpSpPr>
+        <p:sp>
+          <p:nvSpPr>
+            <p:cNvPr id="79" name="Shape 140">
+              <a:extLst>
+                <a:ext uri="{FF2B5EF4-FFF2-40B4-BE49-F238E27FC236}">
+                  <a16:creationId xmlns:a16="http://schemas.microsoft.com/office/drawing/2014/main" id="{39B46D21-1091-3246-8F9B-41CDE12C89CB}"/>
+                </a:ext>
+              </a:extLst>
+            </p:cNvPr>
+            <p:cNvSpPr/>
+            <p:nvPr/>
+          </p:nvSpPr>
+          <p:spPr>
+            <a:xfrm>
+              <a:off x="0" y="36196"/>
+              <a:ext cx="313706" cy="313707"/>
+            </a:xfrm>
+            <a:prstGeom prst="ellipse">
+              <a:avLst/>
+            </a:prstGeom>
+            <a:ln/>
+          </p:spPr>
+          <p:style>
+            <a:lnRef idx="2">
+              <a:schemeClr val="accent1">
+                <a:shade val="50000"/>
+              </a:schemeClr>
+            </a:lnRef>
+            <a:fillRef idx="1">
+              <a:schemeClr val="accent1"/>
+            </a:fillRef>
+            <a:effectRef idx="0">
+              <a:schemeClr val="accent1"/>
+            </a:effectRef>
+            <a:fontRef idx="minor">
+              <a:schemeClr val="lt1"/>
+            </a:fontRef>
+          </p:style>
+          <p:txBody>
+            <a:bodyPr wrap="square" lIns="50800" tIns="50800" rIns="50800" bIns="50800" numCol="1" anchor="ctr">
+              <a:noAutofit/>
+            </a:bodyPr>
+            <a:lstStyle/>
+            <a:p>
+              <a:pPr>
+                <a:defRPr sz="1000" b="1">
+                  <a:solidFill>
+                    <a:srgbClr val="FFFFFF"/>
+                  </a:solidFill>
+                  <a:latin typeface="Helvetica"/>
+                  <a:ea typeface="Helvetica"/>
+                  <a:cs typeface="Helvetica"/>
+                  <a:sym typeface="Helvetica"/>
+                </a:defRPr>
+              </a:pPr>
+              <a:endParaRPr/>
+            </a:p>
+          </p:txBody>
+        </p:sp>
+        <p:sp>
+          <p:nvSpPr>
+            <p:cNvPr id="86" name="Shape 141">
+              <a:extLst>
+                <a:ext uri="{FF2B5EF4-FFF2-40B4-BE49-F238E27FC236}">
+                  <a16:creationId xmlns:a16="http://schemas.microsoft.com/office/drawing/2014/main" id="{5BFCE026-B2B4-9F45-BB60-A740C5E6E828}"/>
+                </a:ext>
+              </a:extLst>
+            </p:cNvPr>
+            <p:cNvSpPr/>
+            <p:nvPr/>
+          </p:nvSpPr>
+          <p:spPr>
+            <a:xfrm>
+              <a:off x="27230" y="0"/>
+              <a:ext cx="259245" cy="386099"/>
+            </a:xfrm>
+            <a:prstGeom prst="rect">
+              <a:avLst/>
+            </a:prstGeom>
+            <a:noFill/>
+            <a:ln w="12700" cap="flat">
+              <a:noFill/>
+              <a:miter lim="400000"/>
+            </a:ln>
+            <a:effectLst/>
+            <a:extLst>
+              <a:ext uri="{C572A759-6A51-4108-AA02-DFA0A04FC94B}">
+                <ma14:wrappingTextBoxFlag xmlns="" xmlns:ma14="http://schemas.microsoft.com/office/mac/drawingml/2011/main" val="1"/>
+              </a:ext>
+            </a:extLst>
+          </p:spPr>
+          <p:txBody>
+            <a:bodyPr wrap="square" lIns="50800" tIns="50800" rIns="50800" bIns="50800" numCol="1" anchor="ctr">
+              <a:noAutofit/>
+            </a:bodyPr>
+            <a:lstStyle>
+              <a:lvl1pPr>
+                <a:defRPr sz="1500" b="1">
+                  <a:solidFill>
+                    <a:srgbClr val="FFFFFF"/>
+                  </a:solidFill>
+                  <a:latin typeface="Helvetica"/>
+                  <a:ea typeface="Helvetica"/>
+                  <a:cs typeface="Helvetica"/>
+                  <a:sym typeface="Helvetica"/>
+                </a:defRPr>
+              </a:lvl1pPr>
+            </a:lstStyle>
+            <a:p>
+              <a:r>
+                <a:t>2</a:t>
+              </a:r>
+            </a:p>
+          </p:txBody>
+        </p:sp>
+      </p:grpSp>
+      <p:pic>
+        <p:nvPicPr>
+          <p:cNvPr id="91" name="Graphic 90">
+            <a:extLst>
+              <a:ext uri="{FF2B5EF4-FFF2-40B4-BE49-F238E27FC236}">
+                <a16:creationId xmlns:a16="http://schemas.microsoft.com/office/drawing/2014/main" id="{0F5FC392-7F62-8546-AD62-3342F4129FF9}"/>
+              </a:ext>
+            </a:extLst>
+          </p:cNvPr>
+          <p:cNvPicPr>
+            <a:picLocks noChangeAspect="1"/>
+          </p:cNvPicPr>
+          <p:nvPr/>
+        </p:nvPicPr>
+        <p:blipFill rotWithShape="1">
+          <a:blip r:embed="rId6">
+            <a:extLst>
+              <a:ext uri="{96DAC541-7B7A-43D3-8B79-37D633B846F1}">
+                <asvg:svgBlip xmlns:asvg="http://schemas.microsoft.com/office/drawing/2016/SVG/main" r:embed="rId7"/>
+              </a:ext>
+            </a:extLst>
+          </a:blip>
+          <a:srcRect l="9959" t="5480" r="10321" b="8525"/>
+          <a:stretch/>
+        </p:blipFill>
+        <p:spPr>
+          <a:xfrm rot="5400000">
+            <a:off x="4901574" y="867543"/>
+            <a:ext cx="979846" cy="1056970"/>
+          </a:xfrm>
+          <a:prstGeom prst="rect">
+            <a:avLst/>
+          </a:prstGeom>
+        </p:spPr>
+      </p:pic>
+      <p:sp>
+        <p:nvSpPr>
+          <p:cNvPr id="136" name="Shape 136"/>
+          <p:cNvSpPr/>
+          <p:nvPr/>
+        </p:nvSpPr>
+        <p:spPr>
+          <a:xfrm>
+            <a:off x="4946005" y="1652792"/>
+            <a:ext cx="890985" cy="339768"/>
+          </a:xfrm>
+          <a:prstGeom prst="rect">
+            <a:avLst/>
+          </a:prstGeom>
+          <a:ln w="12700">
+            <a:miter lim="400000"/>
+          </a:ln>
+          <a:extLst>
+            <a:ext uri="{C572A759-6A51-4108-AA02-DFA0A04FC94B}">
+              <ma14:wrappingTextBoxFlag xmlns="" xmlns:ma14="http://schemas.microsoft.com/office/mac/drawingml/2011/main" val="1"/>
+            </a:ext>
+          </a:extLst>
+        </p:spPr>
+        <p:txBody>
+          <a:bodyPr lIns="50800" tIns="50800" rIns="50800" bIns="50800" anchor="ctr"/>
+          <a:lstStyle>
+            <a:lvl1pPr>
+              <a:spcBef>
+                <a:spcPts val="4200"/>
+              </a:spcBef>
+              <a:defRPr sz="1400">
+                <a:latin typeface="Helvetica"/>
+                <a:ea typeface="Helvetica"/>
+                <a:cs typeface="Helvetica"/>
+                <a:sym typeface="Helvetica"/>
+              </a:defRPr>
+            </a:lvl1pPr>
+          </a:lstStyle>
+          <a:p>
+            <a:r>
+              <a:rPr lang="en-US" dirty="0"/>
+              <a:t>Rules</a:t>
+            </a:r>
+            <a:endParaRPr dirty="0"/>
+          </a:p>
+        </p:txBody>
+      </p:sp>
+      <p:pic>
+        <p:nvPicPr>
+          <p:cNvPr id="92" name="Graphic 91">
+            <a:extLst>
+              <a:ext uri="{FF2B5EF4-FFF2-40B4-BE49-F238E27FC236}">
+                <a16:creationId xmlns:a16="http://schemas.microsoft.com/office/drawing/2014/main" id="{DCF83EE3-E580-3C4F-AEF1-A780CAF5903F}"/>
+              </a:ext>
+            </a:extLst>
+          </p:cNvPr>
+          <p:cNvPicPr>
+            <a:picLocks noChangeAspect="1"/>
+          </p:cNvPicPr>
+          <p:nvPr/>
+        </p:nvPicPr>
+        <p:blipFill rotWithShape="1">
+          <a:blip r:embed="rId8">
+            <a:extLst>
+              <a:ext uri="{96DAC541-7B7A-43D3-8B79-37D633B846F1}">
+                <asvg:svgBlip xmlns:asvg="http://schemas.microsoft.com/office/drawing/2016/SVG/main" r:embed="rId9"/>
+              </a:ext>
+            </a:extLst>
+          </a:blip>
+          <a:srcRect l="7149" t="5848" r="4687" b="3008"/>
+          <a:stretch/>
+        </p:blipFill>
+        <p:spPr>
+          <a:xfrm>
+            <a:off x="6231603" y="1456224"/>
+            <a:ext cx="503853" cy="520888"/>
+          </a:xfrm>
+          <a:prstGeom prst="rect">
+            <a:avLst/>
+          </a:prstGeom>
+        </p:spPr>
+      </p:pic>
+      <p:pic>
+        <p:nvPicPr>
+          <p:cNvPr id="94" name="Graphic 93">
+            <a:extLst>
+              <a:ext uri="{FF2B5EF4-FFF2-40B4-BE49-F238E27FC236}">
+                <a16:creationId xmlns:a16="http://schemas.microsoft.com/office/drawing/2014/main" id="{539A6ADF-FE54-B341-A80A-EF1D2FF79B15}"/>
+              </a:ext>
+            </a:extLst>
+          </p:cNvPr>
+          <p:cNvPicPr>
+            <a:picLocks noChangeAspect="1"/>
+          </p:cNvPicPr>
+          <p:nvPr/>
+        </p:nvPicPr>
+        <p:blipFill rotWithShape="1">
+          <a:blip r:embed="rId8">
+            <a:extLst>
+              <a:ext uri="{96DAC541-7B7A-43D3-8B79-37D633B846F1}">
+                <asvg:svgBlip xmlns:asvg="http://schemas.microsoft.com/office/drawing/2016/SVG/main" r:embed="rId9"/>
+              </a:ext>
+            </a:extLst>
+          </a:blip>
+          <a:srcRect l="7149" t="5848" r="4687" b="3008"/>
+          <a:stretch/>
+        </p:blipFill>
+        <p:spPr>
+          <a:xfrm>
+            <a:off x="6212464" y="628130"/>
+            <a:ext cx="503853" cy="520888"/>
+          </a:xfrm>
+          <a:prstGeom prst="rect">
+            <a:avLst/>
+          </a:prstGeom>
+        </p:spPr>
+      </p:pic>
+      <p:sp>
+        <p:nvSpPr>
+          <p:cNvPr id="97" name="TextBox 96">
+            <a:extLst>
+              <a:ext uri="{FF2B5EF4-FFF2-40B4-BE49-F238E27FC236}">
+                <a16:creationId xmlns:a16="http://schemas.microsoft.com/office/drawing/2014/main" id="{51FB4587-79CD-8B41-B33A-090250D1B19C}"/>
+              </a:ext>
+            </a:extLst>
+          </p:cNvPr>
+          <p:cNvSpPr txBox="1"/>
+          <p:nvPr/>
+        </p:nvSpPr>
+        <p:spPr>
+          <a:xfrm>
+            <a:off x="7600888" y="1209110"/>
+            <a:ext cx="1269341" cy="584775"/>
+          </a:xfrm>
+          <a:prstGeom prst="rect">
+            <a:avLst/>
+          </a:prstGeom>
+          <a:noFill/>
+        </p:spPr>
+        <p:txBody>
+          <a:bodyPr wrap="square" rtlCol="0">
+            <a:spAutoFit/>
+          </a:bodyPr>
+          <a:lstStyle/>
+          <a:p>
+            <a:pPr algn="ctr"/>
+            <a:r>
+              <a:rPr lang="en-US" sz="1600" dirty="0">
+                <a:solidFill>
+                  <a:srgbClr val="232F3E"/>
+                </a:solidFill>
+                <a:latin typeface="Helvetica" pitchFamily="2" charset="0"/>
+              </a:rPr>
+              <a:t>Processing Component</a:t>
+            </a:r>
+          </a:p>
+        </p:txBody>
+      </p:sp>
+      <p:pic>
+        <p:nvPicPr>
+          <p:cNvPr id="98" name="Graphic 97">
+            <a:extLst>
+              <a:ext uri="{FF2B5EF4-FFF2-40B4-BE49-F238E27FC236}">
+                <a16:creationId xmlns:a16="http://schemas.microsoft.com/office/drawing/2014/main" id="{53709067-DA79-F84C-8AB1-74FC9A4F9A6D}"/>
+              </a:ext>
+            </a:extLst>
+          </p:cNvPr>
+          <p:cNvPicPr>
+            <a:picLocks noChangeAspect="1"/>
+          </p:cNvPicPr>
+          <p:nvPr/>
+        </p:nvPicPr>
+        <p:blipFill>
+          <a:blip r:embed="rId10">
+            <a:extLst>
+              <a:ext uri="{96DAC541-7B7A-43D3-8B79-37D633B846F1}">
+                <asvg:svgBlip xmlns:asvg="http://schemas.microsoft.com/office/drawing/2016/SVG/main" r:embed="rId11"/>
+              </a:ext>
+            </a:extLst>
+          </a:blip>
+          <a:stretch>
+            <a:fillRect/>
+          </a:stretch>
+        </p:blipFill>
+        <p:spPr>
+          <a:xfrm>
+            <a:off x="7914213" y="1889260"/>
+            <a:ext cx="640080" cy="640080"/>
+          </a:xfrm>
+          <a:prstGeom prst="rect">
+            <a:avLst/>
+          </a:prstGeom>
+        </p:spPr>
+      </p:pic>
+      <p:pic>
+        <p:nvPicPr>
+          <p:cNvPr id="101" name="Graphic 100">
+            <a:extLst>
+              <a:ext uri="{FF2B5EF4-FFF2-40B4-BE49-F238E27FC236}">
+                <a16:creationId xmlns:a16="http://schemas.microsoft.com/office/drawing/2014/main" id="{F73CE35E-0E0F-7B4A-A8A0-3147CCF43DA2}"/>
+              </a:ext>
+            </a:extLst>
+          </p:cNvPr>
+          <p:cNvPicPr>
+            <a:picLocks noChangeAspect="1"/>
+          </p:cNvPicPr>
+          <p:nvPr/>
+        </p:nvPicPr>
+        <p:blipFill>
+          <a:blip r:embed="rId10">
+            <a:extLst>
+              <a:ext uri="{96DAC541-7B7A-43D3-8B79-37D633B846F1}">
+                <asvg:svgBlip xmlns:asvg="http://schemas.microsoft.com/office/drawing/2016/SVG/main" r:embed="rId11"/>
+              </a:ext>
+            </a:extLst>
+          </a:blip>
+          <a:stretch>
+            <a:fillRect/>
+          </a:stretch>
+        </p:blipFill>
+        <p:spPr>
+          <a:xfrm>
+            <a:off x="9284944" y="1889260"/>
+            <a:ext cx="640080" cy="640080"/>
+          </a:xfrm>
+          <a:prstGeom prst="rect">
+            <a:avLst/>
+          </a:prstGeom>
+        </p:spPr>
+      </p:pic>
+      <p:grpSp>
+        <p:nvGrpSpPr>
+          <p:cNvPr id="103" name="Group 102">
+            <a:extLst>
+              <a:ext uri="{FF2B5EF4-FFF2-40B4-BE49-F238E27FC236}">
+                <a16:creationId xmlns:a16="http://schemas.microsoft.com/office/drawing/2014/main" id="{14FCF73B-12AB-C942-A987-7300D69726BB}"/>
+              </a:ext>
+            </a:extLst>
+          </p:cNvPr>
+          <p:cNvGrpSpPr/>
+          <p:nvPr/>
+        </p:nvGrpSpPr>
+        <p:grpSpPr>
+          <a:xfrm>
+            <a:off x="4908427" y="731598"/>
+            <a:ext cx="344594" cy="386100"/>
+            <a:chOff x="5242522" y="1170511"/>
+            <a:chExt cx="344594" cy="386100"/>
+          </a:xfrm>
+        </p:grpSpPr>
+        <p:sp>
+          <p:nvSpPr>
+            <p:cNvPr id="104" name="Shape 143">
+              <a:extLst>
+                <a:ext uri="{FF2B5EF4-FFF2-40B4-BE49-F238E27FC236}">
+                  <a16:creationId xmlns:a16="http://schemas.microsoft.com/office/drawing/2014/main" id="{BC470CC7-D727-204A-9152-896F4EC33CBE}"/>
+                </a:ext>
+              </a:extLst>
+            </p:cNvPr>
+            <p:cNvSpPr/>
+            <p:nvPr/>
+          </p:nvSpPr>
+          <p:spPr>
+            <a:xfrm>
+              <a:off x="5242522" y="1191264"/>
+              <a:ext cx="344594" cy="344594"/>
+            </a:xfrm>
+            <a:prstGeom prst="ellipse">
+              <a:avLst/>
+            </a:prstGeom>
+            <a:ln/>
+          </p:spPr>
+          <p:style>
+            <a:lnRef idx="2">
+              <a:schemeClr val="accent1">
+                <a:shade val="50000"/>
+              </a:schemeClr>
+            </a:lnRef>
+            <a:fillRef idx="1">
+              <a:schemeClr val="accent1"/>
+            </a:fillRef>
+            <a:effectRef idx="0">
+              <a:schemeClr val="accent1"/>
+            </a:effectRef>
+            <a:fontRef idx="minor">
+              <a:schemeClr val="lt1"/>
+            </a:fontRef>
+          </p:style>
+          <p:txBody>
+            <a:bodyPr lIns="50800" tIns="50800" rIns="50800" bIns="50800" anchor="ctr"/>
+            <a:lstStyle/>
+            <a:p>
+              <a:pPr>
+                <a:defRPr sz="1000" b="1">
+                  <a:solidFill>
+                    <a:srgbClr val="FFFFFF"/>
+                  </a:solidFill>
+                  <a:latin typeface="Helvetica"/>
+                  <a:ea typeface="Helvetica"/>
+                  <a:cs typeface="Helvetica"/>
+                  <a:sym typeface="Helvetica"/>
+                </a:defRPr>
+              </a:pPr>
+              <a:endParaRPr/>
+            </a:p>
+          </p:txBody>
+        </p:sp>
+        <p:sp>
+          <p:nvSpPr>
+            <p:cNvPr id="105" name="Shape 144">
+              <a:extLst>
+                <a:ext uri="{FF2B5EF4-FFF2-40B4-BE49-F238E27FC236}">
+                  <a16:creationId xmlns:a16="http://schemas.microsoft.com/office/drawing/2014/main" id="{27417F58-4DE6-C440-B4FC-07D733F353A2}"/>
+                </a:ext>
+              </a:extLst>
+            </p:cNvPr>
+            <p:cNvSpPr/>
+            <p:nvPr/>
+          </p:nvSpPr>
+          <p:spPr>
+            <a:xfrm>
+              <a:off x="5285196" y="1170511"/>
+              <a:ext cx="259245" cy="386100"/>
+            </a:xfrm>
+            <a:prstGeom prst="rect">
+              <a:avLst/>
+            </a:prstGeom>
+            <a:ln w="12700">
+              <a:miter lim="400000"/>
+            </a:ln>
+            <a:extLst>
+              <a:ext uri="{C572A759-6A51-4108-AA02-DFA0A04FC94B}">
+                <ma14:wrappingTextBoxFlag xmlns="" xmlns:ma14="http://schemas.microsoft.com/office/mac/drawingml/2011/main" val="1"/>
+              </a:ext>
+            </a:extLst>
+          </p:spPr>
+          <p:txBody>
+            <a:bodyPr lIns="50800" tIns="50800" rIns="50800" bIns="50800" anchor="ctr"/>
+            <a:lstStyle>
+              <a:lvl1pPr>
+                <a:defRPr sz="1500" b="1">
+                  <a:solidFill>
+                    <a:srgbClr val="FFFFFF"/>
+                  </a:solidFill>
+                  <a:latin typeface="Helvetica"/>
+                  <a:ea typeface="Helvetica"/>
+                  <a:cs typeface="Helvetica"/>
+                  <a:sym typeface="Helvetica"/>
+                </a:defRPr>
+              </a:lvl1pPr>
+            </a:lstStyle>
+            <a:p>
+              <a:r>
+                <a:rPr dirty="0"/>
+                <a:t>3</a:t>
+              </a:r>
+            </a:p>
+          </p:txBody>
+        </p:sp>
+      </p:grpSp>
+      <p:grpSp>
+        <p:nvGrpSpPr>
+          <p:cNvPr id="106" name="Group 236">
+            <a:extLst>
+              <a:ext uri="{FF2B5EF4-FFF2-40B4-BE49-F238E27FC236}">
+                <a16:creationId xmlns:a16="http://schemas.microsoft.com/office/drawing/2014/main" id="{7B509E26-E580-0D49-B495-CBBCE1CCD155}"/>
+              </a:ext>
+            </a:extLst>
+          </p:cNvPr>
+          <p:cNvGrpSpPr/>
+          <p:nvPr/>
+        </p:nvGrpSpPr>
+        <p:grpSpPr>
+          <a:xfrm>
+            <a:off x="7367506" y="2344068"/>
+            <a:ext cx="344594" cy="386100"/>
+            <a:chOff x="0" y="0"/>
+            <a:chExt cx="344593" cy="386098"/>
+          </a:xfrm>
+        </p:grpSpPr>
+        <p:sp>
+          <p:nvSpPr>
+            <p:cNvPr id="107" name="Shape 234">
+              <a:extLst>
+                <a:ext uri="{FF2B5EF4-FFF2-40B4-BE49-F238E27FC236}">
+                  <a16:creationId xmlns:a16="http://schemas.microsoft.com/office/drawing/2014/main" id="{26394964-2E84-544B-A3B3-E9E1C041013D}"/>
+                </a:ext>
+              </a:extLst>
+            </p:cNvPr>
+            <p:cNvSpPr/>
+            <p:nvPr/>
+          </p:nvSpPr>
+          <p:spPr>
+            <a:xfrm>
+              <a:off x="0" y="20752"/>
+              <a:ext cx="344594" cy="344594"/>
+            </a:xfrm>
+            <a:prstGeom prst="ellipse">
+              <a:avLst/>
+            </a:prstGeom>
+            <a:ln/>
+          </p:spPr>
+          <p:style>
+            <a:lnRef idx="2">
+              <a:schemeClr val="accent1">
+                <a:shade val="50000"/>
+              </a:schemeClr>
+            </a:lnRef>
+            <a:fillRef idx="1">
+              <a:schemeClr val="accent1"/>
+            </a:fillRef>
+            <a:effectRef idx="0">
+              <a:schemeClr val="accent1"/>
+            </a:effectRef>
+            <a:fontRef idx="minor">
+              <a:schemeClr val="lt1"/>
+            </a:fontRef>
+          </p:style>
+          <p:txBody>
+            <a:bodyPr wrap="square" lIns="50800" tIns="50800" rIns="50800" bIns="50800" numCol="1" anchor="ctr">
+              <a:noAutofit/>
+            </a:bodyPr>
+            <a:lstStyle/>
+            <a:p>
+              <a:pPr>
+                <a:defRPr sz="1000" b="1">
+                  <a:solidFill>
+                    <a:srgbClr val="FFFFFF"/>
+                  </a:solidFill>
+                  <a:latin typeface="Helvetica"/>
+                  <a:ea typeface="Helvetica"/>
+                  <a:cs typeface="Helvetica"/>
+                  <a:sym typeface="Helvetica"/>
+                </a:defRPr>
+              </a:pPr>
+              <a:endParaRPr/>
+            </a:p>
+          </p:txBody>
+        </p:sp>
+        <p:sp>
+          <p:nvSpPr>
+            <p:cNvPr id="108" name="Shape 235">
+              <a:extLst>
+                <a:ext uri="{FF2B5EF4-FFF2-40B4-BE49-F238E27FC236}">
+                  <a16:creationId xmlns:a16="http://schemas.microsoft.com/office/drawing/2014/main" id="{8EDA0089-570C-8349-B050-429EBA461C25}"/>
+                </a:ext>
+              </a:extLst>
+            </p:cNvPr>
+            <p:cNvSpPr/>
+            <p:nvPr/>
+          </p:nvSpPr>
+          <p:spPr>
+            <a:xfrm>
+              <a:off x="42674" y="0"/>
+              <a:ext cx="259245" cy="386099"/>
+            </a:xfrm>
+            <a:prstGeom prst="rect">
+              <a:avLst/>
+            </a:prstGeom>
+            <a:noFill/>
+            <a:ln w="12700" cap="flat">
+              <a:noFill/>
+              <a:miter lim="400000"/>
+            </a:ln>
+            <a:effectLst/>
+            <a:extLst>
+              <a:ext uri="{C572A759-6A51-4108-AA02-DFA0A04FC94B}">
+                <ma14:wrappingTextBoxFlag xmlns="" xmlns:ma14="http://schemas.microsoft.com/office/mac/drawingml/2011/main" val="1"/>
+              </a:ext>
+            </a:extLst>
+          </p:spPr>
+          <p:txBody>
+            <a:bodyPr wrap="square" lIns="50800" tIns="50800" rIns="50800" bIns="50800" numCol="1" anchor="ctr">
+              <a:noAutofit/>
+            </a:bodyPr>
+            <a:lstStyle>
+              <a:lvl1pPr>
+                <a:defRPr sz="1500" b="1">
+                  <a:solidFill>
+                    <a:srgbClr val="FFFFFF"/>
+                  </a:solidFill>
+                  <a:latin typeface="Helvetica"/>
+                  <a:ea typeface="Helvetica"/>
+                  <a:cs typeface="Helvetica"/>
+                  <a:sym typeface="Helvetica"/>
+                </a:defRPr>
+              </a:lvl1pPr>
+            </a:lstStyle>
+            <a:p>
+              <a:r>
+                <a:rPr lang="en-US" dirty="0"/>
+                <a:t>5</a:t>
+              </a:r>
+              <a:endParaRPr dirty="0"/>
+            </a:p>
+          </p:txBody>
+        </p:sp>
+      </p:grpSp>
+      <p:grpSp>
+        <p:nvGrpSpPr>
+          <p:cNvPr id="109" name="Group 236">
+            <a:extLst>
+              <a:ext uri="{FF2B5EF4-FFF2-40B4-BE49-F238E27FC236}">
+                <a16:creationId xmlns:a16="http://schemas.microsoft.com/office/drawing/2014/main" id="{05C89246-437B-0E41-9455-4CE75EE809B5}"/>
+              </a:ext>
+            </a:extLst>
+          </p:cNvPr>
+          <p:cNvGrpSpPr/>
+          <p:nvPr/>
+        </p:nvGrpSpPr>
+        <p:grpSpPr>
+          <a:xfrm>
+            <a:off x="7367506" y="418028"/>
+            <a:ext cx="344594" cy="386100"/>
+            <a:chOff x="0" y="0"/>
+            <a:chExt cx="344593" cy="386098"/>
+          </a:xfrm>
+        </p:grpSpPr>
+        <p:sp>
+          <p:nvSpPr>
+            <p:cNvPr id="110" name="Shape 234">
+              <a:extLst>
+                <a:ext uri="{FF2B5EF4-FFF2-40B4-BE49-F238E27FC236}">
+                  <a16:creationId xmlns:a16="http://schemas.microsoft.com/office/drawing/2014/main" id="{5979C2BA-F577-D943-8C14-0CE2715D1C88}"/>
+                </a:ext>
+              </a:extLst>
+            </p:cNvPr>
+            <p:cNvSpPr/>
+            <p:nvPr/>
+          </p:nvSpPr>
+          <p:spPr>
+            <a:xfrm>
+              <a:off x="0" y="20752"/>
+              <a:ext cx="344594" cy="344594"/>
+            </a:xfrm>
+            <a:prstGeom prst="ellipse">
+              <a:avLst/>
+            </a:prstGeom>
+            <a:ln/>
+          </p:spPr>
+          <p:style>
+            <a:lnRef idx="2">
+              <a:schemeClr val="accent1">
+                <a:shade val="50000"/>
+              </a:schemeClr>
+            </a:lnRef>
+            <a:fillRef idx="1">
+              <a:schemeClr val="accent1"/>
+            </a:fillRef>
+            <a:effectRef idx="0">
+              <a:schemeClr val="accent1"/>
+            </a:effectRef>
+            <a:fontRef idx="minor">
+              <a:schemeClr val="lt1"/>
+            </a:fontRef>
+          </p:style>
+          <p:txBody>
+            <a:bodyPr wrap="square" lIns="50800" tIns="50800" rIns="50800" bIns="50800" numCol="1" anchor="ctr">
+              <a:noAutofit/>
+            </a:bodyPr>
+            <a:lstStyle/>
+            <a:p>
+              <a:pPr>
+                <a:defRPr sz="1000" b="1">
+                  <a:solidFill>
+                    <a:srgbClr val="FFFFFF"/>
+                  </a:solidFill>
+                  <a:latin typeface="Helvetica"/>
+                  <a:ea typeface="Helvetica"/>
+                  <a:cs typeface="Helvetica"/>
+                  <a:sym typeface="Helvetica"/>
+                </a:defRPr>
+              </a:pPr>
+              <a:endParaRPr/>
+            </a:p>
+          </p:txBody>
+        </p:sp>
+        <p:sp>
+          <p:nvSpPr>
+            <p:cNvPr id="111" name="Shape 235">
+              <a:extLst>
+                <a:ext uri="{FF2B5EF4-FFF2-40B4-BE49-F238E27FC236}">
+                  <a16:creationId xmlns:a16="http://schemas.microsoft.com/office/drawing/2014/main" id="{7DDBDF3C-ACE6-4C42-983A-3163F1D41B1E}"/>
+                </a:ext>
+              </a:extLst>
+            </p:cNvPr>
+            <p:cNvSpPr/>
+            <p:nvPr/>
+          </p:nvSpPr>
+          <p:spPr>
+            <a:xfrm>
+              <a:off x="42674" y="0"/>
+              <a:ext cx="259245" cy="386099"/>
+            </a:xfrm>
+            <a:prstGeom prst="rect">
+              <a:avLst/>
+            </a:prstGeom>
+            <a:noFill/>
+            <a:ln w="12700" cap="flat">
+              <a:noFill/>
+              <a:miter lim="400000"/>
+            </a:ln>
+            <a:effectLst/>
+            <a:extLst>
+              <a:ext uri="{C572A759-6A51-4108-AA02-DFA0A04FC94B}">
+                <ma14:wrappingTextBoxFlag xmlns="" xmlns:ma14="http://schemas.microsoft.com/office/mac/drawingml/2011/main" val="1"/>
+              </a:ext>
+            </a:extLst>
+          </p:spPr>
+          <p:txBody>
+            <a:bodyPr wrap="square" lIns="50800" tIns="50800" rIns="50800" bIns="50800" numCol="1" anchor="ctr">
+              <a:noAutofit/>
+            </a:bodyPr>
+            <a:lstStyle>
+              <a:lvl1pPr>
+                <a:defRPr sz="1500" b="1">
+                  <a:solidFill>
+                    <a:srgbClr val="FFFFFF"/>
+                  </a:solidFill>
+                  <a:latin typeface="Helvetica"/>
+                  <a:ea typeface="Helvetica"/>
+                  <a:cs typeface="Helvetica"/>
+                  <a:sym typeface="Helvetica"/>
+                </a:defRPr>
+              </a:lvl1pPr>
+            </a:lstStyle>
+            <a:p>
+              <a:r>
+                <a:rPr lang="en-US" dirty="0"/>
+                <a:t>4</a:t>
+              </a:r>
+              <a:endParaRPr dirty="0"/>
+            </a:p>
+          </p:txBody>
+        </p:sp>
+      </p:grpSp>
+      <p:grpSp>
+        <p:nvGrpSpPr>
+          <p:cNvPr id="112" name="Group 218">
+            <a:extLst>
+              <a:ext uri="{FF2B5EF4-FFF2-40B4-BE49-F238E27FC236}">
+                <a16:creationId xmlns:a16="http://schemas.microsoft.com/office/drawing/2014/main" id="{A6A4DA11-5AFF-E04D-9E77-5F47B4A9B0FE}"/>
+              </a:ext>
+            </a:extLst>
+          </p:cNvPr>
+          <p:cNvGrpSpPr/>
+          <p:nvPr/>
+        </p:nvGrpSpPr>
+        <p:grpSpPr>
+          <a:xfrm>
+            <a:off x="5887009" y="3571375"/>
+            <a:ext cx="344594" cy="386100"/>
+            <a:chOff x="0" y="0"/>
+            <a:chExt cx="344593" cy="386098"/>
+          </a:xfrm>
+        </p:grpSpPr>
+        <p:sp>
+          <p:nvSpPr>
+            <p:cNvPr id="113" name="Shape 216">
+              <a:extLst>
+                <a:ext uri="{FF2B5EF4-FFF2-40B4-BE49-F238E27FC236}">
+                  <a16:creationId xmlns:a16="http://schemas.microsoft.com/office/drawing/2014/main" id="{FEA8C0A4-5B73-D84C-B4CD-15D45833A914}"/>
+                </a:ext>
+              </a:extLst>
+            </p:cNvPr>
+            <p:cNvSpPr/>
+            <p:nvPr/>
+          </p:nvSpPr>
+          <p:spPr>
+            <a:xfrm>
+              <a:off x="0" y="20752"/>
+              <a:ext cx="344594" cy="344594"/>
+            </a:xfrm>
+            <a:prstGeom prst="ellipse">
+              <a:avLst/>
+            </a:prstGeom>
+            <a:ln/>
+          </p:spPr>
+          <p:style>
+            <a:lnRef idx="2">
+              <a:schemeClr val="accent1">
+                <a:shade val="50000"/>
+              </a:schemeClr>
+            </a:lnRef>
+            <a:fillRef idx="1">
+              <a:schemeClr val="accent1"/>
+            </a:fillRef>
+            <a:effectRef idx="0">
+              <a:schemeClr val="accent1"/>
+            </a:effectRef>
+            <a:fontRef idx="minor">
+              <a:schemeClr val="lt1"/>
+            </a:fontRef>
+          </p:style>
+          <p:txBody>
+            <a:bodyPr wrap="square" lIns="50800" tIns="50800" rIns="50800" bIns="50800" numCol="1" anchor="ctr">
+              <a:noAutofit/>
+            </a:bodyPr>
+            <a:lstStyle/>
+            <a:p>
+              <a:pPr>
+                <a:defRPr sz="1000" b="1">
+                  <a:solidFill>
+                    <a:srgbClr val="FFFFFF"/>
+                  </a:solidFill>
+                  <a:latin typeface="Helvetica"/>
+                  <a:ea typeface="Helvetica"/>
+                  <a:cs typeface="Helvetica"/>
+                  <a:sym typeface="Helvetica"/>
+                </a:defRPr>
+              </a:pPr>
+              <a:endParaRPr/>
+            </a:p>
+          </p:txBody>
+        </p:sp>
+        <p:sp>
+          <p:nvSpPr>
+            <p:cNvPr id="114" name="Shape 217">
+              <a:extLst>
+                <a:ext uri="{FF2B5EF4-FFF2-40B4-BE49-F238E27FC236}">
+                  <a16:creationId xmlns:a16="http://schemas.microsoft.com/office/drawing/2014/main" id="{8165EA7D-1FFA-2545-A240-67639DB02277}"/>
+                </a:ext>
+              </a:extLst>
+            </p:cNvPr>
+            <p:cNvSpPr/>
+            <p:nvPr/>
+          </p:nvSpPr>
+          <p:spPr>
+            <a:xfrm>
+              <a:off x="42674" y="0"/>
+              <a:ext cx="259245" cy="386099"/>
+            </a:xfrm>
+            <a:prstGeom prst="rect">
+              <a:avLst/>
+            </a:prstGeom>
+            <a:noFill/>
+            <a:ln w="12700" cap="flat">
+              <a:noFill/>
+              <a:miter lim="400000"/>
+            </a:ln>
+            <a:effectLst/>
+            <a:extLst>
+              <a:ext uri="{C572A759-6A51-4108-AA02-DFA0A04FC94B}">
+                <ma14:wrappingTextBoxFlag xmlns="" xmlns:ma14="http://schemas.microsoft.com/office/mac/drawingml/2011/main" val="1"/>
+              </a:ext>
+            </a:extLst>
+          </p:spPr>
+          <p:txBody>
+            <a:bodyPr wrap="square" lIns="50800" tIns="50800" rIns="50800" bIns="50800" numCol="1" anchor="ctr">
+              <a:noAutofit/>
+            </a:bodyPr>
+            <a:lstStyle>
+              <a:lvl1pPr>
+                <a:defRPr sz="1500" b="1">
+                  <a:solidFill>
+                    <a:srgbClr val="FFFFFF"/>
+                  </a:solidFill>
+                  <a:latin typeface="Helvetica"/>
+                  <a:ea typeface="Helvetica"/>
+                  <a:cs typeface="Helvetica"/>
+                  <a:sym typeface="Helvetica"/>
+                </a:defRPr>
+              </a:lvl1pPr>
+            </a:lstStyle>
+            <a:p>
+              <a:r>
+                <a:t>6</a:t>
+              </a:r>
+            </a:p>
+          </p:txBody>
+        </p:sp>
+      </p:grpSp>
+      <p:sp>
+        <p:nvSpPr>
+          <p:cNvPr id="2" name="Rounded Rectangle 1">
+            <a:extLst>
+              <a:ext uri="{FF2B5EF4-FFF2-40B4-BE49-F238E27FC236}">
+                <a16:creationId xmlns:a16="http://schemas.microsoft.com/office/drawing/2014/main" id="{FA0FBFCE-96E0-6140-9108-5BF0BFAEB3B4}"/>
+              </a:ext>
+            </a:extLst>
+          </p:cNvPr>
+          <p:cNvSpPr/>
+          <p:nvPr/>
+        </p:nvSpPr>
+        <p:spPr>
+          <a:xfrm>
+            <a:off x="7915518" y="563009"/>
+            <a:ext cx="640080" cy="640080"/>
+          </a:xfrm>
+          <a:prstGeom prst="roundRect">
+            <a:avLst/>
+          </a:prstGeom>
+          <a:solidFill>
+            <a:srgbClr val="FFFFFF"/>
+          </a:solidFill>
+          <a:ln w="25400" cap="flat">
+            <a:solidFill>
+              <a:srgbClr val="232F3D"/>
+            </a:solidFill>
+            <a:miter lim="400000"/>
+          </a:ln>
+          <a:effectLst/>
+          <a:sp3d/>
+        </p:spPr>
+        <p:style>
+          <a:lnRef idx="0">
+            <a:scrgbClr r="0" g="0" b="0"/>
+          </a:lnRef>
+          <a:fillRef idx="0">
+            <a:scrgbClr r="0" g="0" b="0"/>
+          </a:fillRef>
+          <a:effectRef idx="0">
+            <a:scrgbClr r="0" g="0" b="0"/>
+          </a:effectRef>
+          <a:fontRef idx="none"/>
+        </p:style>
+        <p:txBody>
+          <a:bodyPr rot="0" spcFirstLastPara="1" vertOverflow="overflow" horzOverflow="overflow" vert="horz" wrap="square" lIns="50800" tIns="50800" rIns="50800" bIns="50800" numCol="1" spcCol="38100" rtlCol="0" anchor="ctr">
+            <a:spAutoFit/>
+          </a:bodyPr>
+          <a:lstStyle/>
+          <a:p>
+            <a:pPr marL="0" marR="0" indent="0" algn="ctr" defTabSz="584200" rtl="0" fontAlgn="auto" latinLnBrk="0" hangingPunct="0">
+              <a:lnSpc>
+                <a:spcPct val="100000"/>
+              </a:lnSpc>
+              <a:spcBef>
+                <a:spcPts val="0"/>
+              </a:spcBef>
+              <a:spcAft>
+                <a:spcPts val="0"/>
+              </a:spcAft>
+              <a:buClrTx/>
+              <a:buSzTx/>
+              <a:buFontTx/>
+              <a:buNone/>
+              <a:tabLst/>
+            </a:pPr>
+            <a:endParaRPr kumimoji="0" lang="en-US" sz="2400" b="0" i="0" u="none" strike="noStrike" cap="none" spc="0" normalizeH="0" baseline="0">
+              <a:ln>
+                <a:noFill/>
+              </a:ln>
+              <a:solidFill>
+                <a:srgbClr val="FFFFFF"/>
+              </a:solidFill>
+              <a:effectLst/>
+              <a:uFillTx/>
+              <a:latin typeface="+mn-lt"/>
+              <a:ea typeface="+mn-ea"/>
+              <a:cs typeface="+mn-cs"/>
+              <a:sym typeface="Helvetica Light"/>
+            </a:endParaRPr>
+          </a:p>
+        </p:txBody>
+      </p:sp>
+      <p:sp>
+        <p:nvSpPr>
+          <p:cNvPr id="4" name="Snip Diagonal Corner Rectangle 3">
+            <a:extLst>
+              <a:ext uri="{FF2B5EF4-FFF2-40B4-BE49-F238E27FC236}">
+                <a16:creationId xmlns:a16="http://schemas.microsoft.com/office/drawing/2014/main" id="{E35C3C09-11F4-1D41-9285-B3170BB8C743}"/>
+              </a:ext>
+            </a:extLst>
+          </p:cNvPr>
+          <p:cNvSpPr/>
+          <p:nvPr/>
+        </p:nvSpPr>
+        <p:spPr>
+          <a:xfrm>
+            <a:off x="8098398" y="738003"/>
+            <a:ext cx="274320" cy="274320"/>
+          </a:xfrm>
+          <a:prstGeom prst="snip2DiagRect">
+            <a:avLst/>
+          </a:prstGeom>
+          <a:solidFill>
+            <a:srgbClr val="FFFFFF"/>
+          </a:solidFill>
+          <a:ln w="22225" cap="flat">
+            <a:solidFill>
+              <a:srgbClr val="232F3D"/>
+            </a:solidFill>
+            <a:miter lim="400000"/>
+          </a:ln>
+          <a:effectLst>
+            <a:outerShdw blurRad="38100" dist="25400" dir="5400000" rotWithShape="0">
+              <a:srgbClr val="000000">
+                <a:alpha val="50000"/>
+              </a:srgbClr>
+            </a:outerShdw>
+          </a:effectLst>
+          <a:sp3d/>
+        </p:spPr>
+        <p:style>
+          <a:lnRef idx="0">
+            <a:scrgbClr r="0" g="0" b="0"/>
+          </a:lnRef>
+          <a:fillRef idx="0">
+            <a:scrgbClr r="0" g="0" b="0"/>
+          </a:fillRef>
+          <a:effectRef idx="0">
+            <a:scrgbClr r="0" g="0" b="0"/>
+          </a:effectRef>
+          <a:fontRef idx="none"/>
+        </p:style>
+        <p:txBody>
+          <a:bodyPr rot="0" spcFirstLastPara="1" vertOverflow="overflow" horzOverflow="overflow" vert="horz" wrap="square" lIns="50800" tIns="50800" rIns="50800" bIns="50800" numCol="1" spcCol="38100" rtlCol="0" anchor="ctr">
+            <a:spAutoFit/>
+          </a:bodyPr>
+          <a:lstStyle/>
+          <a:p>
+            <a:pPr marL="0" marR="0" indent="0" algn="ctr" defTabSz="584200" rtl="0" fontAlgn="auto" latinLnBrk="0" hangingPunct="0">
+              <a:lnSpc>
+                <a:spcPct val="100000"/>
+              </a:lnSpc>
+              <a:spcBef>
+                <a:spcPts val="0"/>
+              </a:spcBef>
+              <a:spcAft>
+                <a:spcPts val="0"/>
+              </a:spcAft>
+              <a:buClrTx/>
+              <a:buSzTx/>
+              <a:buFontTx/>
+              <a:buNone/>
+              <a:tabLst/>
+            </a:pPr>
+            <a:endParaRPr kumimoji="0" lang="en-US" sz="2400" b="0" i="0" u="none" strike="noStrike" cap="none" spc="0" normalizeH="0" baseline="0">
+              <a:ln>
+                <a:noFill/>
+              </a:ln>
+              <a:solidFill>
+                <a:srgbClr val="FFFFFF"/>
+              </a:solidFill>
+              <a:effectLst/>
+              <a:uFillTx/>
+              <a:latin typeface="+mn-lt"/>
+              <a:ea typeface="+mn-ea"/>
+              <a:cs typeface="+mn-cs"/>
+              <a:sym typeface="Helvetica Light"/>
+            </a:endParaRPr>
+          </a:p>
+        </p:txBody>
+      </p:sp>
+      <p:sp>
+        <p:nvSpPr>
+          <p:cNvPr id="115" name="Rounded Rectangle 114">
+            <a:extLst>
+              <a:ext uri="{FF2B5EF4-FFF2-40B4-BE49-F238E27FC236}">
+                <a16:creationId xmlns:a16="http://schemas.microsoft.com/office/drawing/2014/main" id="{3BA0E724-4C86-BD43-A731-64A07B61ED14}"/>
+              </a:ext>
+            </a:extLst>
+          </p:cNvPr>
+          <p:cNvSpPr/>
+          <p:nvPr/>
+        </p:nvSpPr>
+        <p:spPr>
+          <a:xfrm>
+            <a:off x="6372720" y="3114506"/>
+            <a:ext cx="640080" cy="640080"/>
+          </a:xfrm>
+          <a:prstGeom prst="roundRect">
+            <a:avLst/>
+          </a:prstGeom>
+          <a:solidFill>
+            <a:srgbClr val="FFFFFF"/>
+          </a:solidFill>
+          <a:ln w="25400" cap="flat">
+            <a:solidFill>
+              <a:srgbClr val="232F3D"/>
+            </a:solidFill>
+            <a:miter lim="400000"/>
+          </a:ln>
+          <a:effectLst/>
+          <a:sp3d/>
+        </p:spPr>
+        <p:style>
+          <a:lnRef idx="0">
+            <a:scrgbClr r="0" g="0" b="0"/>
+          </a:lnRef>
+          <a:fillRef idx="0">
+            <a:scrgbClr r="0" g="0" b="0"/>
+          </a:fillRef>
+          <a:effectRef idx="0">
+            <a:scrgbClr r="0" g="0" b="0"/>
+          </a:effectRef>
+          <a:fontRef idx="none"/>
+        </p:style>
+        <p:txBody>
+          <a:bodyPr rot="0" spcFirstLastPara="1" vertOverflow="overflow" horzOverflow="overflow" vert="horz" wrap="square" lIns="50800" tIns="50800" rIns="50800" bIns="50800" numCol="1" spcCol="38100" rtlCol="0" anchor="ctr">
+            <a:spAutoFit/>
+          </a:bodyPr>
+          <a:lstStyle/>
+          <a:p>
+            <a:pPr marL="0" marR="0" indent="0" algn="ctr" defTabSz="584200" rtl="0" fontAlgn="auto" latinLnBrk="0" hangingPunct="0">
+              <a:lnSpc>
+                <a:spcPct val="100000"/>
+              </a:lnSpc>
+              <a:spcBef>
+                <a:spcPts val="0"/>
+              </a:spcBef>
+              <a:spcAft>
+                <a:spcPts val="0"/>
+              </a:spcAft>
+              <a:buClrTx/>
+              <a:buSzTx/>
+              <a:buFontTx/>
+              <a:buNone/>
+              <a:tabLst/>
+            </a:pPr>
+            <a:endParaRPr kumimoji="0" lang="en-US" sz="2400" b="0" i="0" u="none" strike="noStrike" cap="none" spc="0" normalizeH="0" baseline="0">
+              <a:ln>
+                <a:noFill/>
+              </a:ln>
+              <a:solidFill>
+                <a:srgbClr val="FFFFFF"/>
+              </a:solidFill>
+              <a:effectLst/>
+              <a:uFillTx/>
+              <a:latin typeface="+mn-lt"/>
+              <a:ea typeface="+mn-ea"/>
+              <a:cs typeface="+mn-cs"/>
+              <a:sym typeface="Helvetica Light"/>
+            </a:endParaRPr>
+          </a:p>
+        </p:txBody>
+      </p:sp>
+      <p:sp>
+        <p:nvSpPr>
+          <p:cNvPr id="116" name="Snip Diagonal Corner Rectangle 115">
+            <a:extLst>
+              <a:ext uri="{FF2B5EF4-FFF2-40B4-BE49-F238E27FC236}">
+                <a16:creationId xmlns:a16="http://schemas.microsoft.com/office/drawing/2014/main" id="{EC1FB0B6-C468-B046-A90F-E5F7BF01F700}"/>
+              </a:ext>
+            </a:extLst>
+          </p:cNvPr>
+          <p:cNvSpPr/>
+          <p:nvPr/>
+        </p:nvSpPr>
+        <p:spPr>
+          <a:xfrm>
+            <a:off x="6555600" y="3289500"/>
+            <a:ext cx="274320" cy="274320"/>
+          </a:xfrm>
+          <a:prstGeom prst="snip2DiagRect">
+            <a:avLst/>
+          </a:prstGeom>
+          <a:solidFill>
+            <a:srgbClr val="FFFFFF"/>
+          </a:solidFill>
+          <a:ln w="22225" cap="flat">
+            <a:solidFill>
+              <a:srgbClr val="232F3D"/>
+            </a:solidFill>
+            <a:miter lim="400000"/>
+          </a:ln>
+          <a:effectLst>
+            <a:outerShdw blurRad="38100" dist="25400" dir="5400000" rotWithShape="0">
+              <a:srgbClr val="000000">
+                <a:alpha val="50000"/>
+              </a:srgbClr>
+            </a:outerShdw>
+          </a:effectLst>
+          <a:sp3d/>
+        </p:spPr>
+        <p:style>
+          <a:lnRef idx="0">
+            <a:scrgbClr r="0" g="0" b="0"/>
+          </a:lnRef>
+          <a:fillRef idx="0">
+            <a:scrgbClr r="0" g="0" b="0"/>
+          </a:fillRef>
+          <a:effectRef idx="0">
+            <a:scrgbClr r="0" g="0" b="0"/>
+          </a:effectRef>
+          <a:fontRef idx="none"/>
+        </p:style>
+        <p:txBody>
+          <a:bodyPr rot="0" spcFirstLastPara="1" vertOverflow="overflow" horzOverflow="overflow" vert="horz" wrap="square" lIns="50800" tIns="50800" rIns="50800" bIns="50800" numCol="1" spcCol="38100" rtlCol="0" anchor="ctr">
+            <a:spAutoFit/>
+          </a:bodyPr>
+          <a:lstStyle/>
+          <a:p>
+            <a:pPr marL="0" marR="0" indent="0" algn="ctr" defTabSz="584200" rtl="0" fontAlgn="auto" latinLnBrk="0" hangingPunct="0">
+              <a:lnSpc>
+                <a:spcPct val="100000"/>
+              </a:lnSpc>
+              <a:spcBef>
+                <a:spcPts val="0"/>
+              </a:spcBef>
+              <a:spcAft>
+                <a:spcPts val="0"/>
+              </a:spcAft>
+              <a:buClrTx/>
+              <a:buSzTx/>
+              <a:buFontTx/>
+              <a:buNone/>
+              <a:tabLst/>
+            </a:pPr>
+            <a:endParaRPr kumimoji="0" lang="en-US" sz="2400" b="0" i="0" u="none" strike="noStrike" cap="none" spc="0" normalizeH="0" baseline="0">
+              <a:ln>
+                <a:noFill/>
+              </a:ln>
+              <a:solidFill>
+                <a:srgbClr val="FFFFFF"/>
+              </a:solidFill>
+              <a:effectLst/>
+              <a:uFillTx/>
+              <a:latin typeface="+mn-lt"/>
+              <a:ea typeface="+mn-ea"/>
+              <a:cs typeface="+mn-cs"/>
+              <a:sym typeface="Helvetica Light"/>
+            </a:endParaRPr>
+          </a:p>
+        </p:txBody>
+      </p:sp>
+      <p:sp>
+        <p:nvSpPr>
+          <p:cNvPr id="117" name="Shape 131">
+            <a:extLst>
+              <a:ext uri="{FF2B5EF4-FFF2-40B4-BE49-F238E27FC236}">
+                <a16:creationId xmlns:a16="http://schemas.microsoft.com/office/drawing/2014/main" id="{72F3CE4E-212A-EC45-B995-97CF188E084D}"/>
+              </a:ext>
+            </a:extLst>
+          </p:cNvPr>
+          <p:cNvSpPr/>
+          <p:nvPr/>
+        </p:nvSpPr>
+        <p:spPr>
+          <a:xfrm>
+            <a:off x="4798436" y="354515"/>
+            <a:ext cx="1938096" cy="416988"/>
+          </a:xfrm>
+          <a:prstGeom prst="rect">
+            <a:avLst/>
+          </a:prstGeom>
+          <a:ln w="12700">
+            <a:miter lim="400000"/>
+          </a:ln>
+          <a:extLst>
+            <a:ext uri="{C572A759-6A51-4108-AA02-DFA0A04FC94B}">
+              <ma14:wrappingTextBoxFlag xmlns="" xmlns:ma14="http://schemas.microsoft.com/office/mac/drawingml/2011/main" val="1"/>
+            </a:ext>
+          </a:extLst>
+        </p:spPr>
+        <p:txBody>
+          <a:bodyPr lIns="50800" tIns="50800" rIns="50800" bIns="50800" anchor="ctr"/>
+          <a:lstStyle>
+            <a:lvl1pPr>
+              <a:defRPr sz="1800">
+                <a:latin typeface="Helvetica"/>
+                <a:ea typeface="Helvetica"/>
+                <a:cs typeface="Helvetica"/>
+                <a:sym typeface="Helvetica"/>
+              </a:defRPr>
+            </a:lvl1pPr>
+          </a:lstStyle>
+          <a:p>
+            <a:r>
+              <a:rPr lang="en-US" dirty="0"/>
+              <a:t>Server</a:t>
+            </a:r>
+            <a:endParaRPr dirty="0"/>
+          </a:p>
+        </p:txBody>
+      </p:sp>
     </p:spTree>
+    <p:extLst>
+      <p:ext uri="{BB962C8B-B14F-4D97-AF65-F5344CB8AC3E}">
+        <p14:creationId xmlns:p14="http://schemas.microsoft.com/office/powerpoint/2010/main" val="4259666320"/>
+      </p:ext>
+    </p:extLst>
   </p:cSld>
   <p:clrMapOvr>
     <a:masterClrMapping/>

</xml_diff>